<commit_message>
One new diagram, paper is now fully written, will submit for review soon
</commit_message>
<xml_diff>
--- a/Diagrams.pptx
+++ b/Diagrams.pptx
@@ -7,6 +7,7 @@
   <p:sldIdLst>
     <p:sldId id="256" r:id="rId2"/>
     <p:sldId id="257" r:id="rId3"/>
+    <p:sldId id="258" r:id="rId4"/>
   </p:sldIdLst>
   <p:sldSz cx="12192000" cy="6858000"/>
   <p:notesSz cx="6858000" cy="9144000"/>
@@ -105,6 +106,11 @@
       </a:defRPr>
     </a:lvl9pPr>
   </p:defaultTextStyle>
+  <p:extLst>
+    <p:ext uri="{EFAFB233-063F-42B5-8137-9DF3F51BA10A}">
+      <p15:sldGuideLst xmlns:p15="http://schemas.microsoft.com/office/powerpoint/2012/main"/>
+    </p:ext>
+  </p:extLst>
 </p:presentation>
 </file>
 
@@ -257,7 +263,7 @@
           <a:p>
             <a:fld id="{9F67FADE-1ED8-4631-AAB7-FADA107C6CD4}" type="datetimeFigureOut">
               <a:rPr lang="en-GB" smtClean="0"/>
-              <a:t>20/02/2021</a:t>
+              <a:t>22/02/2021</a:t>
             </a:fld>
             <a:endParaRPr lang="en-GB"/>
           </a:p>
@@ -457,7 +463,7 @@
           <a:p>
             <a:fld id="{9F67FADE-1ED8-4631-AAB7-FADA107C6CD4}" type="datetimeFigureOut">
               <a:rPr lang="en-GB" smtClean="0"/>
-              <a:t>20/02/2021</a:t>
+              <a:t>22/02/2021</a:t>
             </a:fld>
             <a:endParaRPr lang="en-GB"/>
           </a:p>
@@ -667,7 +673,7 @@
           <a:p>
             <a:fld id="{9F67FADE-1ED8-4631-AAB7-FADA107C6CD4}" type="datetimeFigureOut">
               <a:rPr lang="en-GB" smtClean="0"/>
-              <a:t>20/02/2021</a:t>
+              <a:t>22/02/2021</a:t>
             </a:fld>
             <a:endParaRPr lang="en-GB"/>
           </a:p>
@@ -867,7 +873,7 @@
           <a:p>
             <a:fld id="{9F67FADE-1ED8-4631-AAB7-FADA107C6CD4}" type="datetimeFigureOut">
               <a:rPr lang="en-GB" smtClean="0"/>
-              <a:t>20/02/2021</a:t>
+              <a:t>22/02/2021</a:t>
             </a:fld>
             <a:endParaRPr lang="en-GB"/>
           </a:p>
@@ -1143,7 +1149,7 @@
           <a:p>
             <a:fld id="{9F67FADE-1ED8-4631-AAB7-FADA107C6CD4}" type="datetimeFigureOut">
               <a:rPr lang="en-GB" smtClean="0"/>
-              <a:t>20/02/2021</a:t>
+              <a:t>22/02/2021</a:t>
             </a:fld>
             <a:endParaRPr lang="en-GB"/>
           </a:p>
@@ -1411,7 +1417,7 @@
           <a:p>
             <a:fld id="{9F67FADE-1ED8-4631-AAB7-FADA107C6CD4}" type="datetimeFigureOut">
               <a:rPr lang="en-GB" smtClean="0"/>
-              <a:t>20/02/2021</a:t>
+              <a:t>22/02/2021</a:t>
             </a:fld>
             <a:endParaRPr lang="en-GB"/>
           </a:p>
@@ -1826,7 +1832,7 @@
           <a:p>
             <a:fld id="{9F67FADE-1ED8-4631-AAB7-FADA107C6CD4}" type="datetimeFigureOut">
               <a:rPr lang="en-GB" smtClean="0"/>
-              <a:t>20/02/2021</a:t>
+              <a:t>22/02/2021</a:t>
             </a:fld>
             <a:endParaRPr lang="en-GB"/>
           </a:p>
@@ -1968,7 +1974,7 @@
           <a:p>
             <a:fld id="{9F67FADE-1ED8-4631-AAB7-FADA107C6CD4}" type="datetimeFigureOut">
               <a:rPr lang="en-GB" smtClean="0"/>
-              <a:t>20/02/2021</a:t>
+              <a:t>22/02/2021</a:t>
             </a:fld>
             <a:endParaRPr lang="en-GB"/>
           </a:p>
@@ -2081,7 +2087,7 @@
           <a:p>
             <a:fld id="{9F67FADE-1ED8-4631-AAB7-FADA107C6CD4}" type="datetimeFigureOut">
               <a:rPr lang="en-GB" smtClean="0"/>
-              <a:t>20/02/2021</a:t>
+              <a:t>22/02/2021</a:t>
             </a:fld>
             <a:endParaRPr lang="en-GB"/>
           </a:p>
@@ -2394,7 +2400,7 @@
           <a:p>
             <a:fld id="{9F67FADE-1ED8-4631-AAB7-FADA107C6CD4}" type="datetimeFigureOut">
               <a:rPr lang="en-GB" smtClean="0"/>
-              <a:t>20/02/2021</a:t>
+              <a:t>22/02/2021</a:t>
             </a:fld>
             <a:endParaRPr lang="en-GB"/>
           </a:p>
@@ -2683,7 +2689,7 @@
           <a:p>
             <a:fld id="{9F67FADE-1ED8-4631-AAB7-FADA107C6CD4}" type="datetimeFigureOut">
               <a:rPr lang="en-GB" smtClean="0"/>
-              <a:t>20/02/2021</a:t>
+              <a:t>22/02/2021</a:t>
             </a:fld>
             <a:endParaRPr lang="en-GB"/>
           </a:p>
@@ -2926,7 +2932,7 @@
           <a:p>
             <a:fld id="{9F67FADE-1ED8-4631-AAB7-FADA107C6CD4}" type="datetimeFigureOut">
               <a:rPr lang="en-GB" smtClean="0"/>
-              <a:t>20/02/2021</a:t>
+              <a:t>22/02/2021</a:t>
             </a:fld>
             <a:endParaRPr lang="en-GB"/>
           </a:p>
@@ -11029,6 +11035,2310 @@
     <p:extLst>
       <p:ext uri="{BB962C8B-B14F-4D97-AF65-F5344CB8AC3E}">
         <p14:creationId xmlns:p14="http://schemas.microsoft.com/office/powerpoint/2010/main" val="1523099352"/>
+      </p:ext>
+    </p:extLst>
+  </p:cSld>
+  <p:clrMapOvr>
+    <a:masterClrMapping/>
+  </p:clrMapOvr>
+</p:sld>
+</file>
+
+<file path=ppt/slides/slide3.xml><?xml version="1.0" encoding="utf-8"?>
+<p:sld xmlns:a="http://schemas.openxmlformats.org/drawingml/2006/main" xmlns:r="http://schemas.openxmlformats.org/officeDocument/2006/relationships" xmlns:p="http://schemas.openxmlformats.org/presentationml/2006/main">
+  <p:cSld>
+    <p:spTree>
+      <p:nvGrpSpPr>
+        <p:cNvPr id="1" name=""/>
+        <p:cNvGrpSpPr/>
+        <p:nvPr/>
+      </p:nvGrpSpPr>
+      <p:grpSpPr>
+        <a:xfrm>
+          <a:off x="0" y="0"/>
+          <a:ext cx="0" cy="0"/>
+          <a:chOff x="0" y="0"/>
+          <a:chExt cx="0" cy="0"/>
+        </a:xfrm>
+      </p:grpSpPr>
+      <mc:AlternateContent xmlns:mc="http://schemas.openxmlformats.org/markup-compatibility/2006">
+        <mc:Choice xmlns:a14="http://schemas.microsoft.com/office/drawing/2010/main" Requires="a14">
+          <p:sp>
+            <p:nvSpPr>
+              <p:cNvPr id="4" name="TextBox 3">
+                <a:extLst>
+                  <a:ext uri="{FF2B5EF4-FFF2-40B4-BE49-F238E27FC236}">
+                    <a16:creationId xmlns:a16="http://schemas.microsoft.com/office/drawing/2014/main" id="{4CC76A5B-0639-4401-92C3-E825682FD6D6}"/>
+                  </a:ext>
+                </a:extLst>
+              </p:cNvPr>
+              <p:cNvSpPr txBox="1"/>
+              <p:nvPr/>
+            </p:nvSpPr>
+            <p:spPr>
+              <a:xfrm>
+                <a:off x="4224216" y="3005015"/>
+                <a:ext cx="604396" cy="276999"/>
+              </a:xfrm>
+              <a:prstGeom prst="rect">
+                <a:avLst/>
+              </a:prstGeom>
+              <a:noFill/>
+            </p:spPr>
+            <p:txBody>
+              <a:bodyPr wrap="none" lIns="0" tIns="0" rIns="0" bIns="0" rtlCol="0">
+                <a:spAutoFit/>
+              </a:bodyPr>
+              <a:lstStyle/>
+              <a:p>
+                <a14:m>
+                  <m:oMathPara xmlns:m="http://schemas.openxmlformats.org/officeDocument/2006/math">
+                    <m:oMathParaPr>
+                      <m:jc m:val="centerGroup"/>
+                    </m:oMathParaPr>
+                    <m:oMath xmlns:m="http://schemas.openxmlformats.org/officeDocument/2006/math">
+                      <m:sSub>
+                        <m:sSubPr>
+                          <m:ctrlPr>
+                            <a:rPr lang="en-GB" b="0" i="1" smtClean="0">
+                              <a:latin typeface="Cambria Math" panose="02040503050406030204" pitchFamily="18" charset="0"/>
+                            </a:rPr>
+                          </m:ctrlPr>
+                        </m:sSubPr>
+                        <m:e>
+                          <m:r>
+                            <a:rPr lang="en-GB" b="0" i="1" smtClean="0">
+                              <a:latin typeface="Cambria Math" panose="02040503050406030204" pitchFamily="18" charset="0"/>
+                            </a:rPr>
+                            <m:t>𝐴</m:t>
+                          </m:r>
+                        </m:e>
+                        <m:sub>
+                          <m:r>
+                            <a:rPr lang="en-GB" b="0" i="1" smtClean="0">
+                              <a:latin typeface="Cambria Math" panose="02040503050406030204" pitchFamily="18" charset="0"/>
+                            </a:rPr>
+                            <m:t>𝑘</m:t>
+                          </m:r>
+                        </m:sub>
+                      </m:sSub>
+                      <m:r>
+                        <a:rPr lang="en-GB" b="0" i="1" smtClean="0">
+                          <a:latin typeface="Cambria Math" panose="02040503050406030204" pitchFamily="18" charset="0"/>
+                        </a:rPr>
+                        <m:t>= </m:t>
+                      </m:r>
+                    </m:oMath>
+                  </m:oMathPara>
+                </a14:m>
+                <a:endParaRPr lang="en-GB" dirty="0"/>
+              </a:p>
+            </p:txBody>
+          </p:sp>
+        </mc:Choice>
+        <mc:Fallback>
+          <p:sp>
+            <p:nvSpPr>
+              <p:cNvPr id="4" name="TextBox 3">
+                <a:extLst>
+                  <a:ext uri="{FF2B5EF4-FFF2-40B4-BE49-F238E27FC236}">
+                    <a16:creationId xmlns:a16="http://schemas.microsoft.com/office/drawing/2014/main" id="{4CC76A5B-0639-4401-92C3-E825682FD6D6}"/>
+                  </a:ext>
+                </a:extLst>
+              </p:cNvPr>
+              <p:cNvSpPr txBox="1">
+                <a:spLocks noRot="1" noChangeAspect="1" noMove="1" noResize="1" noEditPoints="1" noAdjustHandles="1" noChangeArrowheads="1" noChangeShapeType="1" noTextEdit="1"/>
+              </p:cNvSpPr>
+              <p:nvPr/>
+            </p:nvSpPr>
+            <p:spPr>
+              <a:xfrm>
+                <a:off x="4224216" y="3005015"/>
+                <a:ext cx="604396" cy="276999"/>
+              </a:xfrm>
+              <a:prstGeom prst="rect">
+                <a:avLst/>
+              </a:prstGeom>
+              <a:blipFill>
+                <a:blip r:embed="rId2"/>
+                <a:stretch>
+                  <a:fillRect l="-9091" b="-17778"/>
+                </a:stretch>
+              </a:blipFill>
+            </p:spPr>
+            <p:txBody>
+              <a:bodyPr/>
+              <a:lstStyle/>
+              <a:p>
+                <a:r>
+                  <a:rPr lang="en-GB">
+                    <a:noFill/>
+                  </a:rPr>
+                  <a:t> </a:t>
+                </a:r>
+              </a:p>
+            </p:txBody>
+          </p:sp>
+        </mc:Fallback>
+      </mc:AlternateContent>
+      <p:sp>
+        <p:nvSpPr>
+          <p:cNvPr id="5" name="Left Bracket 4">
+            <a:extLst>
+              <a:ext uri="{FF2B5EF4-FFF2-40B4-BE49-F238E27FC236}">
+                <a16:creationId xmlns:a16="http://schemas.microsoft.com/office/drawing/2014/main" id="{26DABC1B-B2CC-4B9D-BD3A-1963FD477F1B}"/>
+              </a:ext>
+            </a:extLst>
+          </p:cNvPr>
+          <p:cNvSpPr/>
+          <p:nvPr/>
+        </p:nvSpPr>
+        <p:spPr>
+          <a:xfrm>
+            <a:off x="4811686" y="2182221"/>
+            <a:ext cx="267019" cy="1922585"/>
+          </a:xfrm>
+          <a:prstGeom prst="leftBracket">
+            <a:avLst/>
+          </a:prstGeom>
+          <a:ln w="19050">
+            <a:solidFill>
+              <a:schemeClr val="tx1"/>
+            </a:solidFill>
+          </a:ln>
+        </p:spPr>
+        <p:style>
+          <a:lnRef idx="1">
+            <a:schemeClr val="accent1"/>
+          </a:lnRef>
+          <a:fillRef idx="0">
+            <a:schemeClr val="accent1"/>
+          </a:fillRef>
+          <a:effectRef idx="0">
+            <a:schemeClr val="accent1"/>
+          </a:effectRef>
+          <a:fontRef idx="minor">
+            <a:schemeClr val="tx1"/>
+          </a:fontRef>
+        </p:style>
+        <p:txBody>
+          <a:bodyPr rtlCol="0" anchor="ctr"/>
+          <a:lstStyle/>
+          <a:p>
+            <a:pPr algn="ctr"/>
+            <a:endParaRPr lang="en-GB"/>
+          </a:p>
+        </p:txBody>
+      </p:sp>
+      <p:sp>
+        <p:nvSpPr>
+          <p:cNvPr id="6" name="Right Bracket 5">
+            <a:extLst>
+              <a:ext uri="{FF2B5EF4-FFF2-40B4-BE49-F238E27FC236}">
+                <a16:creationId xmlns:a16="http://schemas.microsoft.com/office/drawing/2014/main" id="{FD83E3C4-9244-4571-BE13-C4BEE3C9EA2D}"/>
+              </a:ext>
+            </a:extLst>
+          </p:cNvPr>
+          <p:cNvSpPr/>
+          <p:nvPr/>
+        </p:nvSpPr>
+        <p:spPr>
+          <a:xfrm>
+            <a:off x="8213965" y="2182221"/>
+            <a:ext cx="267019" cy="1922585"/>
+          </a:xfrm>
+          <a:prstGeom prst="rightBracket">
+            <a:avLst/>
+          </a:prstGeom>
+          <a:ln w="19050">
+            <a:solidFill>
+              <a:schemeClr val="tx1"/>
+            </a:solidFill>
+          </a:ln>
+        </p:spPr>
+        <p:style>
+          <a:lnRef idx="1">
+            <a:schemeClr val="accent1"/>
+          </a:lnRef>
+          <a:fillRef idx="0">
+            <a:schemeClr val="accent1"/>
+          </a:fillRef>
+          <a:effectRef idx="0">
+            <a:schemeClr val="accent1"/>
+          </a:effectRef>
+          <a:fontRef idx="minor">
+            <a:schemeClr val="tx1"/>
+          </a:fontRef>
+        </p:style>
+        <p:txBody>
+          <a:bodyPr rtlCol="0" anchor="ctr"/>
+          <a:lstStyle/>
+          <a:p>
+            <a:pPr algn="ctr"/>
+            <a:endParaRPr lang="en-GB"/>
+          </a:p>
+        </p:txBody>
+      </p:sp>
+      <mc:AlternateContent xmlns:mc="http://schemas.openxmlformats.org/markup-compatibility/2006">
+        <mc:Choice xmlns:a14="http://schemas.microsoft.com/office/drawing/2010/main" Requires="a14">
+          <p:sp>
+            <p:nvSpPr>
+              <p:cNvPr id="7" name="TextBox 6">
+                <a:extLst>
+                  <a:ext uri="{FF2B5EF4-FFF2-40B4-BE49-F238E27FC236}">
+                    <a16:creationId xmlns:a16="http://schemas.microsoft.com/office/drawing/2014/main" id="{96355897-284C-4B90-9F2D-B55A4A45FDA0}"/>
+                  </a:ext>
+                </a:extLst>
+              </p:cNvPr>
+              <p:cNvSpPr txBox="1"/>
+              <p:nvPr/>
+            </p:nvSpPr>
+            <p:spPr>
+              <a:xfrm>
+                <a:off x="4872141" y="2213035"/>
+                <a:ext cx="669671" cy="282578"/>
+              </a:xfrm>
+              <a:prstGeom prst="rect">
+                <a:avLst/>
+              </a:prstGeom>
+              <a:noFill/>
+            </p:spPr>
+            <p:txBody>
+              <a:bodyPr wrap="none" lIns="0" tIns="0" rIns="0" bIns="0" rtlCol="0">
+                <a:spAutoFit/>
+              </a:bodyPr>
+              <a:lstStyle/>
+              <a:p>
+                <a14:m>
+                  <m:oMathPara xmlns:m="http://schemas.openxmlformats.org/officeDocument/2006/math">
+                    <m:oMathParaPr>
+                      <m:jc m:val="centerGroup"/>
+                    </m:oMathParaPr>
+                    <m:oMath xmlns:m="http://schemas.openxmlformats.org/officeDocument/2006/math">
+                      <m:sSubSup>
+                        <m:sSubSupPr>
+                          <m:ctrlPr>
+                            <a:rPr lang="en-GB" b="0" i="1" smtClean="0">
+                              <a:latin typeface="Cambria Math" panose="02040503050406030204" pitchFamily="18" charset="0"/>
+                            </a:rPr>
+                          </m:ctrlPr>
+                        </m:sSubSupPr>
+                        <m:e>
+                          <m:r>
+                            <a:rPr lang="en-GB" b="0" i="1" smtClean="0">
+                              <a:latin typeface="Cambria Math" panose="02040503050406030204" pitchFamily="18" charset="0"/>
+                            </a:rPr>
+                            <m:t>𝑊</m:t>
+                          </m:r>
+                        </m:e>
+                        <m:sub>
+                          <m:r>
+                            <a:rPr lang="en-GB" b="0" i="1" smtClean="0">
+                              <a:latin typeface="Cambria Math" panose="02040503050406030204" pitchFamily="18" charset="0"/>
+                            </a:rPr>
+                            <m:t>𝑁</m:t>
+                          </m:r>
+                        </m:sub>
+                        <m:sup>
+                          <m:r>
+                            <a:rPr lang="en-GB" b="0" i="1" smtClean="0">
+                              <a:latin typeface="Cambria Math" panose="02040503050406030204" pitchFamily="18" charset="0"/>
+                            </a:rPr>
+                            <m:t>0 </m:t>
+                          </m:r>
+                          <m:r>
+                            <a:rPr lang="en-GB" b="0" i="1" smtClean="0">
+                              <a:latin typeface="Cambria Math" panose="02040503050406030204" pitchFamily="18" charset="0"/>
+                            </a:rPr>
+                            <m:t>𝑥</m:t>
+                          </m:r>
+                          <m:r>
+                            <a:rPr lang="en-GB" b="0" i="1" smtClean="0">
+                              <a:latin typeface="Cambria Math" panose="02040503050406030204" pitchFamily="18" charset="0"/>
+                            </a:rPr>
+                            <m:t> 0</m:t>
+                          </m:r>
+                        </m:sup>
+                      </m:sSubSup>
+                    </m:oMath>
+                  </m:oMathPara>
+                </a14:m>
+                <a:endParaRPr lang="en-GB" dirty="0"/>
+              </a:p>
+            </p:txBody>
+          </p:sp>
+        </mc:Choice>
+        <mc:Fallback>
+          <p:sp>
+            <p:nvSpPr>
+              <p:cNvPr id="7" name="TextBox 6">
+                <a:extLst>
+                  <a:ext uri="{FF2B5EF4-FFF2-40B4-BE49-F238E27FC236}">
+                    <a16:creationId xmlns:a16="http://schemas.microsoft.com/office/drawing/2014/main" id="{96355897-284C-4B90-9F2D-B55A4A45FDA0}"/>
+                  </a:ext>
+                </a:extLst>
+              </p:cNvPr>
+              <p:cNvSpPr txBox="1">
+                <a:spLocks noRot="1" noChangeAspect="1" noMove="1" noResize="1" noEditPoints="1" noAdjustHandles="1" noChangeArrowheads="1" noChangeShapeType="1" noTextEdit="1"/>
+              </p:cNvSpPr>
+              <p:nvPr/>
+            </p:nvSpPr>
+            <p:spPr>
+              <a:xfrm>
+                <a:off x="4872141" y="2213035"/>
+                <a:ext cx="669671" cy="282578"/>
+              </a:xfrm>
+              <a:prstGeom prst="rect">
+                <a:avLst/>
+              </a:prstGeom>
+              <a:blipFill>
+                <a:blip r:embed="rId3"/>
+                <a:stretch>
+                  <a:fillRect l="-7273" t="-2174" r="-3636" b="-19565"/>
+                </a:stretch>
+              </a:blipFill>
+            </p:spPr>
+            <p:txBody>
+              <a:bodyPr/>
+              <a:lstStyle/>
+              <a:p>
+                <a:r>
+                  <a:rPr lang="en-GB">
+                    <a:noFill/>
+                  </a:rPr>
+                  <a:t> </a:t>
+                </a:r>
+              </a:p>
+            </p:txBody>
+          </p:sp>
+        </mc:Fallback>
+      </mc:AlternateContent>
+      <mc:AlternateContent xmlns:mc="http://schemas.openxmlformats.org/markup-compatibility/2006">
+        <mc:Choice xmlns:a14="http://schemas.microsoft.com/office/drawing/2010/main" Requires="a14">
+          <p:sp>
+            <p:nvSpPr>
+              <p:cNvPr id="8" name="TextBox 7">
+                <a:extLst>
+                  <a:ext uri="{FF2B5EF4-FFF2-40B4-BE49-F238E27FC236}">
+                    <a16:creationId xmlns:a16="http://schemas.microsoft.com/office/drawing/2014/main" id="{38103CFE-B0B7-4A7C-9718-F4DAE216517C}"/>
+                  </a:ext>
+                </a:extLst>
+              </p:cNvPr>
+              <p:cNvSpPr txBox="1"/>
+              <p:nvPr/>
+            </p:nvSpPr>
+            <p:spPr>
+              <a:xfrm>
+                <a:off x="4872140" y="2588174"/>
+                <a:ext cx="664734" cy="282578"/>
+              </a:xfrm>
+              <a:prstGeom prst="rect">
+                <a:avLst/>
+              </a:prstGeom>
+              <a:noFill/>
+            </p:spPr>
+            <p:txBody>
+              <a:bodyPr wrap="none" lIns="0" tIns="0" rIns="0" bIns="0" rtlCol="0">
+                <a:spAutoFit/>
+              </a:bodyPr>
+              <a:lstStyle/>
+              <a:p>
+                <a14:m>
+                  <m:oMathPara xmlns:m="http://schemas.openxmlformats.org/officeDocument/2006/math">
+                    <m:oMathParaPr>
+                      <m:jc m:val="centerGroup"/>
+                    </m:oMathParaPr>
+                    <m:oMath xmlns:m="http://schemas.openxmlformats.org/officeDocument/2006/math">
+                      <m:sSubSup>
+                        <m:sSubSupPr>
+                          <m:ctrlPr>
+                            <a:rPr lang="en-GB" b="0" i="1" smtClean="0">
+                              <a:latin typeface="Cambria Math" panose="02040503050406030204" pitchFamily="18" charset="0"/>
+                            </a:rPr>
+                          </m:ctrlPr>
+                        </m:sSubSupPr>
+                        <m:e>
+                          <m:r>
+                            <a:rPr lang="en-GB" b="0" i="1" smtClean="0">
+                              <a:latin typeface="Cambria Math" panose="02040503050406030204" pitchFamily="18" charset="0"/>
+                            </a:rPr>
+                            <m:t>𝑊</m:t>
+                          </m:r>
+                        </m:e>
+                        <m:sub>
+                          <m:r>
+                            <a:rPr lang="en-GB" b="0" i="1" smtClean="0">
+                              <a:latin typeface="Cambria Math" panose="02040503050406030204" pitchFamily="18" charset="0"/>
+                            </a:rPr>
+                            <m:t>𝑁</m:t>
+                          </m:r>
+                        </m:sub>
+                        <m:sup>
+                          <m:r>
+                            <a:rPr lang="en-GB" b="0" i="1" smtClean="0">
+                              <a:latin typeface="Cambria Math" panose="02040503050406030204" pitchFamily="18" charset="0"/>
+                            </a:rPr>
+                            <m:t>1 </m:t>
+                          </m:r>
+                          <m:r>
+                            <a:rPr lang="en-GB" b="0" i="1" smtClean="0">
+                              <a:latin typeface="Cambria Math" panose="02040503050406030204" pitchFamily="18" charset="0"/>
+                            </a:rPr>
+                            <m:t>𝑥</m:t>
+                          </m:r>
+                          <m:r>
+                            <a:rPr lang="en-GB" b="0" i="1" smtClean="0">
+                              <a:latin typeface="Cambria Math" panose="02040503050406030204" pitchFamily="18" charset="0"/>
+                            </a:rPr>
+                            <m:t> 0</m:t>
+                          </m:r>
+                        </m:sup>
+                      </m:sSubSup>
+                    </m:oMath>
+                  </m:oMathPara>
+                </a14:m>
+                <a:endParaRPr lang="en-GB" dirty="0"/>
+              </a:p>
+            </p:txBody>
+          </p:sp>
+        </mc:Choice>
+        <mc:Fallback>
+          <p:sp>
+            <p:nvSpPr>
+              <p:cNvPr id="8" name="TextBox 7">
+                <a:extLst>
+                  <a:ext uri="{FF2B5EF4-FFF2-40B4-BE49-F238E27FC236}">
+                    <a16:creationId xmlns:a16="http://schemas.microsoft.com/office/drawing/2014/main" id="{38103CFE-B0B7-4A7C-9718-F4DAE216517C}"/>
+                  </a:ext>
+                </a:extLst>
+              </p:cNvPr>
+              <p:cNvSpPr txBox="1">
+                <a:spLocks noRot="1" noChangeAspect="1" noMove="1" noResize="1" noEditPoints="1" noAdjustHandles="1" noChangeArrowheads="1" noChangeShapeType="1" noTextEdit="1"/>
+              </p:cNvSpPr>
+              <p:nvPr/>
+            </p:nvSpPr>
+            <p:spPr>
+              <a:xfrm>
+                <a:off x="4872140" y="2588174"/>
+                <a:ext cx="664734" cy="282578"/>
+              </a:xfrm>
+              <a:prstGeom prst="rect">
+                <a:avLst/>
+              </a:prstGeom>
+              <a:blipFill>
+                <a:blip r:embed="rId4"/>
+                <a:stretch>
+                  <a:fillRect l="-7339" t="-2174" r="-3670" b="-17391"/>
+                </a:stretch>
+              </a:blipFill>
+            </p:spPr>
+            <p:txBody>
+              <a:bodyPr/>
+              <a:lstStyle/>
+              <a:p>
+                <a:r>
+                  <a:rPr lang="en-GB">
+                    <a:noFill/>
+                  </a:rPr>
+                  <a:t> </a:t>
+                </a:r>
+              </a:p>
+            </p:txBody>
+          </p:sp>
+        </mc:Fallback>
+      </mc:AlternateContent>
+      <mc:AlternateContent xmlns:mc="http://schemas.openxmlformats.org/markup-compatibility/2006">
+        <mc:Choice xmlns:a14="http://schemas.microsoft.com/office/drawing/2010/main" Requires="a14">
+          <p:sp>
+            <p:nvSpPr>
+              <p:cNvPr id="9" name="TextBox 8">
+                <a:extLst>
+                  <a:ext uri="{FF2B5EF4-FFF2-40B4-BE49-F238E27FC236}">
+                    <a16:creationId xmlns:a16="http://schemas.microsoft.com/office/drawing/2014/main" id="{CBF62D46-E18B-4ED2-9EFE-B773F0B0ED46}"/>
+                  </a:ext>
+                </a:extLst>
+              </p:cNvPr>
+              <p:cNvSpPr txBox="1"/>
+              <p:nvPr/>
+            </p:nvSpPr>
+            <p:spPr>
+              <a:xfrm>
+                <a:off x="4872139" y="2958003"/>
+                <a:ext cx="669671" cy="282578"/>
+              </a:xfrm>
+              <a:prstGeom prst="rect">
+                <a:avLst/>
+              </a:prstGeom>
+              <a:noFill/>
+            </p:spPr>
+            <p:txBody>
+              <a:bodyPr wrap="none" lIns="0" tIns="0" rIns="0" bIns="0" rtlCol="0">
+                <a:spAutoFit/>
+              </a:bodyPr>
+              <a:lstStyle/>
+              <a:p>
+                <a14:m>
+                  <m:oMathPara xmlns:m="http://schemas.openxmlformats.org/officeDocument/2006/math">
+                    <m:oMathParaPr>
+                      <m:jc m:val="centerGroup"/>
+                    </m:oMathParaPr>
+                    <m:oMath xmlns:m="http://schemas.openxmlformats.org/officeDocument/2006/math">
+                      <m:sSubSup>
+                        <m:sSubSupPr>
+                          <m:ctrlPr>
+                            <a:rPr lang="en-GB" b="0" i="1" smtClean="0">
+                              <a:latin typeface="Cambria Math" panose="02040503050406030204" pitchFamily="18" charset="0"/>
+                            </a:rPr>
+                          </m:ctrlPr>
+                        </m:sSubSupPr>
+                        <m:e>
+                          <m:r>
+                            <a:rPr lang="en-GB" b="0" i="1" smtClean="0">
+                              <a:latin typeface="Cambria Math" panose="02040503050406030204" pitchFamily="18" charset="0"/>
+                            </a:rPr>
+                            <m:t>𝑊</m:t>
+                          </m:r>
+                        </m:e>
+                        <m:sub>
+                          <m:r>
+                            <a:rPr lang="en-GB" b="0" i="1" smtClean="0">
+                              <a:latin typeface="Cambria Math" panose="02040503050406030204" pitchFamily="18" charset="0"/>
+                            </a:rPr>
+                            <m:t>𝑁</m:t>
+                          </m:r>
+                        </m:sub>
+                        <m:sup>
+                          <m:r>
+                            <a:rPr lang="en-GB" b="0" i="1" smtClean="0">
+                              <a:latin typeface="Cambria Math" panose="02040503050406030204" pitchFamily="18" charset="0"/>
+                            </a:rPr>
+                            <m:t>2 </m:t>
+                          </m:r>
+                          <m:r>
+                            <a:rPr lang="en-GB" b="0" i="1" smtClean="0">
+                              <a:latin typeface="Cambria Math" panose="02040503050406030204" pitchFamily="18" charset="0"/>
+                            </a:rPr>
+                            <m:t>𝑥</m:t>
+                          </m:r>
+                          <m:r>
+                            <a:rPr lang="en-GB" b="0" i="1" smtClean="0">
+                              <a:latin typeface="Cambria Math" panose="02040503050406030204" pitchFamily="18" charset="0"/>
+                            </a:rPr>
+                            <m:t> 0</m:t>
+                          </m:r>
+                        </m:sup>
+                      </m:sSubSup>
+                    </m:oMath>
+                  </m:oMathPara>
+                </a14:m>
+                <a:endParaRPr lang="en-GB" dirty="0"/>
+              </a:p>
+            </p:txBody>
+          </p:sp>
+        </mc:Choice>
+        <mc:Fallback>
+          <p:sp>
+            <p:nvSpPr>
+              <p:cNvPr id="9" name="TextBox 8">
+                <a:extLst>
+                  <a:ext uri="{FF2B5EF4-FFF2-40B4-BE49-F238E27FC236}">
+                    <a16:creationId xmlns:a16="http://schemas.microsoft.com/office/drawing/2014/main" id="{CBF62D46-E18B-4ED2-9EFE-B773F0B0ED46}"/>
+                  </a:ext>
+                </a:extLst>
+              </p:cNvPr>
+              <p:cNvSpPr txBox="1">
+                <a:spLocks noRot="1" noChangeAspect="1" noMove="1" noResize="1" noEditPoints="1" noAdjustHandles="1" noChangeArrowheads="1" noChangeShapeType="1" noTextEdit="1"/>
+              </p:cNvSpPr>
+              <p:nvPr/>
+            </p:nvSpPr>
+            <p:spPr>
+              <a:xfrm>
+                <a:off x="4872139" y="2958003"/>
+                <a:ext cx="669671" cy="282578"/>
+              </a:xfrm>
+              <a:prstGeom prst="rect">
+                <a:avLst/>
+              </a:prstGeom>
+              <a:blipFill>
+                <a:blip r:embed="rId5"/>
+                <a:stretch>
+                  <a:fillRect l="-7273" t="-2128" r="-3636" b="-17021"/>
+                </a:stretch>
+              </a:blipFill>
+            </p:spPr>
+            <p:txBody>
+              <a:bodyPr/>
+              <a:lstStyle/>
+              <a:p>
+                <a:r>
+                  <a:rPr lang="en-GB">
+                    <a:noFill/>
+                  </a:rPr>
+                  <a:t> </a:t>
+                </a:r>
+              </a:p>
+            </p:txBody>
+          </p:sp>
+        </mc:Fallback>
+      </mc:AlternateContent>
+      <mc:AlternateContent xmlns:mc="http://schemas.openxmlformats.org/markup-compatibility/2006">
+        <mc:Choice xmlns:a14="http://schemas.microsoft.com/office/drawing/2010/main" Requires="a14">
+          <p:sp>
+            <p:nvSpPr>
+              <p:cNvPr id="10" name="TextBox 9">
+                <a:extLst>
+                  <a:ext uri="{FF2B5EF4-FFF2-40B4-BE49-F238E27FC236}">
+                    <a16:creationId xmlns:a16="http://schemas.microsoft.com/office/drawing/2014/main" id="{58F88C38-8FC2-449A-B771-4B0C1C6E3F58}"/>
+                  </a:ext>
+                </a:extLst>
+              </p:cNvPr>
+              <p:cNvSpPr txBox="1"/>
+              <p:nvPr/>
+            </p:nvSpPr>
+            <p:spPr>
+              <a:xfrm>
+                <a:off x="4872138" y="3730981"/>
+                <a:ext cx="1044453" cy="346249"/>
+              </a:xfrm>
+              <a:prstGeom prst="rect">
+                <a:avLst/>
+              </a:prstGeom>
+              <a:noFill/>
+            </p:spPr>
+            <p:txBody>
+              <a:bodyPr wrap="none" lIns="0" tIns="0" rIns="0" bIns="0" rtlCol="0">
+                <a:spAutoFit/>
+              </a:bodyPr>
+              <a:lstStyle/>
+              <a:p>
+                <a14:m>
+                  <m:oMathPara xmlns:m="http://schemas.openxmlformats.org/officeDocument/2006/math">
+                    <m:oMathParaPr>
+                      <m:jc m:val="centerGroup"/>
+                    </m:oMathParaPr>
+                    <m:oMath xmlns:m="http://schemas.openxmlformats.org/officeDocument/2006/math">
+                      <m:sSubSup>
+                        <m:sSubSupPr>
+                          <m:ctrlPr>
+                            <a:rPr lang="en-GB" b="0" i="1" smtClean="0">
+                              <a:latin typeface="Cambria Math" panose="02040503050406030204" pitchFamily="18" charset="0"/>
+                            </a:rPr>
+                          </m:ctrlPr>
+                        </m:sSubSupPr>
+                        <m:e>
+                          <m:r>
+                            <a:rPr lang="en-GB" b="0" i="1" smtClean="0">
+                              <a:latin typeface="Cambria Math" panose="02040503050406030204" pitchFamily="18" charset="0"/>
+                            </a:rPr>
+                            <m:t>𝑊</m:t>
+                          </m:r>
+                        </m:e>
+                        <m:sub>
+                          <m:r>
+                            <a:rPr lang="en-GB" b="0" i="1" smtClean="0">
+                              <a:latin typeface="Cambria Math" panose="02040503050406030204" pitchFamily="18" charset="0"/>
+                            </a:rPr>
+                            <m:t>𝑁</m:t>
+                          </m:r>
+                        </m:sub>
+                        <m:sup>
+                          <m:r>
+                            <a:rPr lang="en-GB" b="0" i="1" smtClean="0">
+                              <a:latin typeface="Cambria Math" panose="02040503050406030204" pitchFamily="18" charset="0"/>
+                            </a:rPr>
+                            <m:t>(</m:t>
+                          </m:r>
+                          <m:r>
+                            <a:rPr lang="en-GB" b="0" i="1" smtClean="0">
+                              <a:latin typeface="Cambria Math" panose="02040503050406030204" pitchFamily="18" charset="0"/>
+                            </a:rPr>
+                            <m:t>𝑛</m:t>
+                          </m:r>
+                          <m:r>
+                            <a:rPr lang="en-GB" b="0" i="1" smtClean="0">
+                              <a:latin typeface="Cambria Math" panose="02040503050406030204" pitchFamily="18" charset="0"/>
+                            </a:rPr>
+                            <m:t>−1) </m:t>
+                          </m:r>
+                          <m:r>
+                            <a:rPr lang="en-GB" b="0" i="1" smtClean="0">
+                              <a:latin typeface="Cambria Math" panose="02040503050406030204" pitchFamily="18" charset="0"/>
+                            </a:rPr>
+                            <m:t>𝑥</m:t>
+                          </m:r>
+                          <m:r>
+                            <a:rPr lang="en-GB" b="0" i="1" smtClean="0">
+                              <a:latin typeface="Cambria Math" panose="02040503050406030204" pitchFamily="18" charset="0"/>
+                            </a:rPr>
+                            <m:t> 0</m:t>
+                          </m:r>
+                        </m:sup>
+                      </m:sSubSup>
+                    </m:oMath>
+                  </m:oMathPara>
+                </a14:m>
+                <a:endParaRPr lang="en-GB" dirty="0"/>
+              </a:p>
+            </p:txBody>
+          </p:sp>
+        </mc:Choice>
+        <mc:Fallback>
+          <p:sp>
+            <p:nvSpPr>
+              <p:cNvPr id="10" name="TextBox 9">
+                <a:extLst>
+                  <a:ext uri="{FF2B5EF4-FFF2-40B4-BE49-F238E27FC236}">
+                    <a16:creationId xmlns:a16="http://schemas.microsoft.com/office/drawing/2014/main" id="{58F88C38-8FC2-449A-B771-4B0C1C6E3F58}"/>
+                  </a:ext>
+                </a:extLst>
+              </p:cNvPr>
+              <p:cNvSpPr txBox="1">
+                <a:spLocks noRot="1" noChangeAspect="1" noMove="1" noResize="1" noEditPoints="1" noAdjustHandles="1" noChangeArrowheads="1" noChangeShapeType="1" noTextEdit="1"/>
+              </p:cNvSpPr>
+              <p:nvPr/>
+            </p:nvSpPr>
+            <p:spPr>
+              <a:xfrm>
+                <a:off x="4872138" y="3730981"/>
+                <a:ext cx="1044453" cy="346249"/>
+              </a:xfrm>
+              <a:prstGeom prst="rect">
+                <a:avLst/>
+              </a:prstGeom>
+              <a:blipFill>
+                <a:blip r:embed="rId6"/>
+                <a:stretch>
+                  <a:fillRect l="-4651" t="-3509" r="-1744" b="-17544"/>
+                </a:stretch>
+              </a:blipFill>
+            </p:spPr>
+            <p:txBody>
+              <a:bodyPr/>
+              <a:lstStyle/>
+              <a:p>
+                <a:r>
+                  <a:rPr lang="en-GB">
+                    <a:noFill/>
+                  </a:rPr>
+                  <a:t> </a:t>
+                </a:r>
+              </a:p>
+            </p:txBody>
+          </p:sp>
+        </mc:Fallback>
+      </mc:AlternateContent>
+      <p:sp>
+        <p:nvSpPr>
+          <p:cNvPr id="11" name="TextBox 10">
+            <a:extLst>
+              <a:ext uri="{FF2B5EF4-FFF2-40B4-BE49-F238E27FC236}">
+                <a16:creationId xmlns:a16="http://schemas.microsoft.com/office/drawing/2014/main" id="{1EE552CD-D0BB-455A-88BA-83DCD40EDA95}"/>
+              </a:ext>
+            </a:extLst>
+          </p:cNvPr>
+          <p:cNvSpPr txBox="1"/>
+          <p:nvPr/>
+        </p:nvSpPr>
+        <p:spPr>
+          <a:xfrm rot="5400000">
+            <a:off x="4986339" y="3327832"/>
+            <a:ext cx="343364" cy="369332"/>
+          </a:xfrm>
+          <a:prstGeom prst="rect">
+            <a:avLst/>
+          </a:prstGeom>
+          <a:noFill/>
+        </p:spPr>
+        <p:txBody>
+          <a:bodyPr wrap="none" rtlCol="0">
+            <a:spAutoFit/>
+          </a:bodyPr>
+          <a:lstStyle/>
+          <a:p>
+            <a:r>
+              <a:rPr lang="en-GB" dirty="0"/>
+              <a:t>…</a:t>
+            </a:r>
+          </a:p>
+        </p:txBody>
+      </p:sp>
+      <mc:AlternateContent xmlns:mc="http://schemas.openxmlformats.org/markup-compatibility/2006">
+        <mc:Choice xmlns:a14="http://schemas.microsoft.com/office/drawing/2010/main" Requires="a14">
+          <p:sp>
+            <p:nvSpPr>
+              <p:cNvPr id="12" name="TextBox 11">
+                <a:extLst>
+                  <a:ext uri="{FF2B5EF4-FFF2-40B4-BE49-F238E27FC236}">
+                    <a16:creationId xmlns:a16="http://schemas.microsoft.com/office/drawing/2014/main" id="{BA1DECE2-6D39-408D-B205-8D7F7EB52517}"/>
+                  </a:ext>
+                </a:extLst>
+              </p:cNvPr>
+              <p:cNvSpPr txBox="1"/>
+              <p:nvPr/>
+            </p:nvSpPr>
+            <p:spPr>
+              <a:xfrm>
+                <a:off x="5602267" y="2213035"/>
+                <a:ext cx="669671" cy="282578"/>
+              </a:xfrm>
+              <a:prstGeom prst="rect">
+                <a:avLst/>
+              </a:prstGeom>
+              <a:noFill/>
+            </p:spPr>
+            <p:txBody>
+              <a:bodyPr wrap="none" lIns="0" tIns="0" rIns="0" bIns="0" rtlCol="0">
+                <a:spAutoFit/>
+              </a:bodyPr>
+              <a:lstStyle/>
+              <a:p>
+                <a14:m>
+                  <m:oMathPara xmlns:m="http://schemas.openxmlformats.org/officeDocument/2006/math">
+                    <m:oMathParaPr>
+                      <m:jc m:val="centerGroup"/>
+                    </m:oMathParaPr>
+                    <m:oMath xmlns:m="http://schemas.openxmlformats.org/officeDocument/2006/math">
+                      <m:sSubSup>
+                        <m:sSubSupPr>
+                          <m:ctrlPr>
+                            <a:rPr lang="en-GB" b="0" i="1" smtClean="0">
+                              <a:latin typeface="Cambria Math" panose="02040503050406030204" pitchFamily="18" charset="0"/>
+                            </a:rPr>
+                          </m:ctrlPr>
+                        </m:sSubSupPr>
+                        <m:e>
+                          <m:r>
+                            <a:rPr lang="en-GB" b="0" i="1" smtClean="0">
+                              <a:latin typeface="Cambria Math" panose="02040503050406030204" pitchFamily="18" charset="0"/>
+                            </a:rPr>
+                            <m:t>𝑊</m:t>
+                          </m:r>
+                        </m:e>
+                        <m:sub>
+                          <m:r>
+                            <a:rPr lang="en-GB" b="0" i="1" smtClean="0">
+                              <a:latin typeface="Cambria Math" panose="02040503050406030204" pitchFamily="18" charset="0"/>
+                            </a:rPr>
+                            <m:t>𝑁</m:t>
+                          </m:r>
+                        </m:sub>
+                        <m:sup>
+                          <m:r>
+                            <a:rPr lang="en-GB" b="0" i="1" smtClean="0">
+                              <a:latin typeface="Cambria Math" panose="02040503050406030204" pitchFamily="18" charset="0"/>
+                            </a:rPr>
+                            <m:t>0 </m:t>
+                          </m:r>
+                          <m:r>
+                            <a:rPr lang="en-GB" b="0" i="1" smtClean="0">
+                              <a:latin typeface="Cambria Math" panose="02040503050406030204" pitchFamily="18" charset="0"/>
+                            </a:rPr>
+                            <m:t>𝑥</m:t>
+                          </m:r>
+                          <m:r>
+                            <a:rPr lang="en-GB" b="0" i="1" smtClean="0">
+                              <a:latin typeface="Cambria Math" panose="02040503050406030204" pitchFamily="18" charset="0"/>
+                            </a:rPr>
+                            <m:t> 0</m:t>
+                          </m:r>
+                        </m:sup>
+                      </m:sSubSup>
+                    </m:oMath>
+                  </m:oMathPara>
+                </a14:m>
+                <a:endParaRPr lang="en-GB" dirty="0"/>
+              </a:p>
+            </p:txBody>
+          </p:sp>
+        </mc:Choice>
+        <mc:Fallback>
+          <p:sp>
+            <p:nvSpPr>
+              <p:cNvPr id="12" name="TextBox 11">
+                <a:extLst>
+                  <a:ext uri="{FF2B5EF4-FFF2-40B4-BE49-F238E27FC236}">
+                    <a16:creationId xmlns:a16="http://schemas.microsoft.com/office/drawing/2014/main" id="{BA1DECE2-6D39-408D-B205-8D7F7EB52517}"/>
+                  </a:ext>
+                </a:extLst>
+              </p:cNvPr>
+              <p:cNvSpPr txBox="1">
+                <a:spLocks noRot="1" noChangeAspect="1" noMove="1" noResize="1" noEditPoints="1" noAdjustHandles="1" noChangeArrowheads="1" noChangeShapeType="1" noTextEdit="1"/>
+              </p:cNvSpPr>
+              <p:nvPr/>
+            </p:nvSpPr>
+            <p:spPr>
+              <a:xfrm>
+                <a:off x="5602267" y="2213035"/>
+                <a:ext cx="669671" cy="282578"/>
+              </a:xfrm>
+              <a:prstGeom prst="rect">
+                <a:avLst/>
+              </a:prstGeom>
+              <a:blipFill>
+                <a:blip r:embed="rId7"/>
+                <a:stretch>
+                  <a:fillRect l="-7273" t="-2174" r="-3636" b="-19565"/>
+                </a:stretch>
+              </a:blipFill>
+            </p:spPr>
+            <p:txBody>
+              <a:bodyPr/>
+              <a:lstStyle/>
+              <a:p>
+                <a:r>
+                  <a:rPr lang="en-GB">
+                    <a:noFill/>
+                  </a:rPr>
+                  <a:t> </a:t>
+                </a:r>
+              </a:p>
+            </p:txBody>
+          </p:sp>
+        </mc:Fallback>
+      </mc:AlternateContent>
+      <mc:AlternateContent xmlns:mc="http://schemas.openxmlformats.org/markup-compatibility/2006">
+        <mc:Choice xmlns:a14="http://schemas.microsoft.com/office/drawing/2010/main" Requires="a14">
+          <p:sp>
+            <p:nvSpPr>
+              <p:cNvPr id="13" name="TextBox 12">
+                <a:extLst>
+                  <a:ext uri="{FF2B5EF4-FFF2-40B4-BE49-F238E27FC236}">
+                    <a16:creationId xmlns:a16="http://schemas.microsoft.com/office/drawing/2014/main" id="{32CB5930-5C8F-4FF7-B4AB-F93590C56AC0}"/>
+                  </a:ext>
+                </a:extLst>
+              </p:cNvPr>
+              <p:cNvSpPr txBox="1"/>
+              <p:nvPr/>
+            </p:nvSpPr>
+            <p:spPr>
+              <a:xfrm>
+                <a:off x="6332393" y="2213035"/>
+                <a:ext cx="669671" cy="282578"/>
+              </a:xfrm>
+              <a:prstGeom prst="rect">
+                <a:avLst/>
+              </a:prstGeom>
+              <a:noFill/>
+            </p:spPr>
+            <p:txBody>
+              <a:bodyPr wrap="none" lIns="0" tIns="0" rIns="0" bIns="0" rtlCol="0">
+                <a:spAutoFit/>
+              </a:bodyPr>
+              <a:lstStyle/>
+              <a:p>
+                <a14:m>
+                  <m:oMathPara xmlns:m="http://schemas.openxmlformats.org/officeDocument/2006/math">
+                    <m:oMathParaPr>
+                      <m:jc m:val="centerGroup"/>
+                    </m:oMathParaPr>
+                    <m:oMath xmlns:m="http://schemas.openxmlformats.org/officeDocument/2006/math">
+                      <m:sSubSup>
+                        <m:sSubSupPr>
+                          <m:ctrlPr>
+                            <a:rPr lang="en-GB" b="0" i="1" smtClean="0">
+                              <a:latin typeface="Cambria Math" panose="02040503050406030204" pitchFamily="18" charset="0"/>
+                            </a:rPr>
+                          </m:ctrlPr>
+                        </m:sSubSupPr>
+                        <m:e>
+                          <m:r>
+                            <a:rPr lang="en-GB" b="0" i="1" smtClean="0">
+                              <a:latin typeface="Cambria Math" panose="02040503050406030204" pitchFamily="18" charset="0"/>
+                            </a:rPr>
+                            <m:t>𝑊</m:t>
+                          </m:r>
+                        </m:e>
+                        <m:sub>
+                          <m:r>
+                            <a:rPr lang="en-GB" b="0" i="1" smtClean="0">
+                              <a:latin typeface="Cambria Math" panose="02040503050406030204" pitchFamily="18" charset="0"/>
+                            </a:rPr>
+                            <m:t>𝑁</m:t>
+                          </m:r>
+                        </m:sub>
+                        <m:sup>
+                          <m:r>
+                            <a:rPr lang="en-GB" b="0" i="1" smtClean="0">
+                              <a:latin typeface="Cambria Math" panose="02040503050406030204" pitchFamily="18" charset="0"/>
+                            </a:rPr>
+                            <m:t>0 </m:t>
+                          </m:r>
+                          <m:r>
+                            <a:rPr lang="en-GB" b="0" i="1" smtClean="0">
+                              <a:latin typeface="Cambria Math" panose="02040503050406030204" pitchFamily="18" charset="0"/>
+                            </a:rPr>
+                            <m:t>𝑥</m:t>
+                          </m:r>
+                          <m:r>
+                            <a:rPr lang="en-GB" b="0" i="1" smtClean="0">
+                              <a:latin typeface="Cambria Math" panose="02040503050406030204" pitchFamily="18" charset="0"/>
+                            </a:rPr>
+                            <m:t> 0</m:t>
+                          </m:r>
+                        </m:sup>
+                      </m:sSubSup>
+                    </m:oMath>
+                  </m:oMathPara>
+                </a14:m>
+                <a:endParaRPr lang="en-GB" dirty="0"/>
+              </a:p>
+            </p:txBody>
+          </p:sp>
+        </mc:Choice>
+        <mc:Fallback>
+          <p:sp>
+            <p:nvSpPr>
+              <p:cNvPr id="13" name="TextBox 12">
+                <a:extLst>
+                  <a:ext uri="{FF2B5EF4-FFF2-40B4-BE49-F238E27FC236}">
+                    <a16:creationId xmlns:a16="http://schemas.microsoft.com/office/drawing/2014/main" id="{32CB5930-5C8F-4FF7-B4AB-F93590C56AC0}"/>
+                  </a:ext>
+                </a:extLst>
+              </p:cNvPr>
+              <p:cNvSpPr txBox="1">
+                <a:spLocks noRot="1" noChangeAspect="1" noMove="1" noResize="1" noEditPoints="1" noAdjustHandles="1" noChangeArrowheads="1" noChangeShapeType="1" noTextEdit="1"/>
+              </p:cNvSpPr>
+              <p:nvPr/>
+            </p:nvSpPr>
+            <p:spPr>
+              <a:xfrm>
+                <a:off x="6332393" y="2213035"/>
+                <a:ext cx="669671" cy="282578"/>
+              </a:xfrm>
+              <a:prstGeom prst="rect">
+                <a:avLst/>
+              </a:prstGeom>
+              <a:blipFill>
+                <a:blip r:embed="rId8"/>
+                <a:stretch>
+                  <a:fillRect l="-8182" t="-2174" r="-2727" b="-19565"/>
+                </a:stretch>
+              </a:blipFill>
+            </p:spPr>
+            <p:txBody>
+              <a:bodyPr/>
+              <a:lstStyle/>
+              <a:p>
+                <a:r>
+                  <a:rPr lang="en-GB">
+                    <a:noFill/>
+                  </a:rPr>
+                  <a:t> </a:t>
+                </a:r>
+              </a:p>
+            </p:txBody>
+          </p:sp>
+        </mc:Fallback>
+      </mc:AlternateContent>
+      <p:sp>
+        <p:nvSpPr>
+          <p:cNvPr id="14" name="TextBox 13">
+            <a:extLst>
+              <a:ext uri="{FF2B5EF4-FFF2-40B4-BE49-F238E27FC236}">
+                <a16:creationId xmlns:a16="http://schemas.microsoft.com/office/drawing/2014/main" id="{7661C084-614B-4CDB-9B05-D45BB8B7791A}"/>
+              </a:ext>
+            </a:extLst>
+          </p:cNvPr>
+          <p:cNvSpPr txBox="1"/>
+          <p:nvPr/>
+        </p:nvSpPr>
+        <p:spPr>
+          <a:xfrm>
+            <a:off x="7062519" y="2138472"/>
+            <a:ext cx="343364" cy="369332"/>
+          </a:xfrm>
+          <a:prstGeom prst="rect">
+            <a:avLst/>
+          </a:prstGeom>
+          <a:noFill/>
+        </p:spPr>
+        <p:txBody>
+          <a:bodyPr wrap="none" rtlCol="0">
+            <a:spAutoFit/>
+          </a:bodyPr>
+          <a:lstStyle/>
+          <a:p>
+            <a:r>
+              <a:rPr lang="en-GB" dirty="0"/>
+              <a:t>…</a:t>
+            </a:r>
+          </a:p>
+        </p:txBody>
+      </p:sp>
+      <mc:AlternateContent xmlns:mc="http://schemas.openxmlformats.org/markup-compatibility/2006">
+        <mc:Choice xmlns:a14="http://schemas.microsoft.com/office/drawing/2010/main" Requires="a14">
+          <p:sp>
+            <p:nvSpPr>
+              <p:cNvPr id="15" name="TextBox 14">
+                <a:extLst>
+                  <a:ext uri="{FF2B5EF4-FFF2-40B4-BE49-F238E27FC236}">
+                    <a16:creationId xmlns:a16="http://schemas.microsoft.com/office/drawing/2014/main" id="{E4789EAD-2442-44FD-B673-CE3C15F8220A}"/>
+                  </a:ext>
+                </a:extLst>
+              </p:cNvPr>
+              <p:cNvSpPr txBox="1"/>
+              <p:nvPr/>
+            </p:nvSpPr>
+            <p:spPr>
+              <a:xfrm>
+                <a:off x="7475314" y="2225226"/>
+                <a:ext cx="1044453" cy="346249"/>
+              </a:xfrm>
+              <a:prstGeom prst="rect">
+                <a:avLst/>
+              </a:prstGeom>
+              <a:noFill/>
+            </p:spPr>
+            <p:txBody>
+              <a:bodyPr wrap="none" lIns="0" tIns="0" rIns="0" bIns="0" rtlCol="0">
+                <a:spAutoFit/>
+              </a:bodyPr>
+              <a:lstStyle/>
+              <a:p>
+                <a14:m>
+                  <m:oMathPara xmlns:m="http://schemas.openxmlformats.org/officeDocument/2006/math">
+                    <m:oMathParaPr>
+                      <m:jc m:val="centerGroup"/>
+                    </m:oMathParaPr>
+                    <m:oMath xmlns:m="http://schemas.openxmlformats.org/officeDocument/2006/math">
+                      <m:sSubSup>
+                        <m:sSubSupPr>
+                          <m:ctrlPr>
+                            <a:rPr lang="en-GB" b="0" i="1" smtClean="0">
+                              <a:latin typeface="Cambria Math" panose="02040503050406030204" pitchFamily="18" charset="0"/>
+                            </a:rPr>
+                          </m:ctrlPr>
+                        </m:sSubSupPr>
+                        <m:e>
+                          <m:r>
+                            <a:rPr lang="en-GB" b="0" i="1" smtClean="0">
+                              <a:latin typeface="Cambria Math" panose="02040503050406030204" pitchFamily="18" charset="0"/>
+                            </a:rPr>
+                            <m:t>𝑊</m:t>
+                          </m:r>
+                        </m:e>
+                        <m:sub>
+                          <m:r>
+                            <a:rPr lang="en-GB" b="0" i="1" smtClean="0">
+                              <a:latin typeface="Cambria Math" panose="02040503050406030204" pitchFamily="18" charset="0"/>
+                            </a:rPr>
+                            <m:t>𝑁</m:t>
+                          </m:r>
+                        </m:sub>
+                        <m:sup>
+                          <m:r>
+                            <a:rPr lang="en-GB" b="0" i="1" smtClean="0">
+                              <a:latin typeface="Cambria Math" panose="02040503050406030204" pitchFamily="18" charset="0"/>
+                            </a:rPr>
+                            <m:t>0 </m:t>
+                          </m:r>
+                          <m:r>
+                            <a:rPr lang="en-GB" b="0" i="1" smtClean="0">
+                              <a:latin typeface="Cambria Math" panose="02040503050406030204" pitchFamily="18" charset="0"/>
+                            </a:rPr>
+                            <m:t>𝑥</m:t>
+                          </m:r>
+                          <m:r>
+                            <a:rPr lang="en-GB" b="0" i="1" smtClean="0">
+                              <a:latin typeface="Cambria Math" panose="02040503050406030204" pitchFamily="18" charset="0"/>
+                            </a:rPr>
+                            <m:t> (</m:t>
+                          </m:r>
+                          <m:r>
+                            <a:rPr lang="en-GB" b="0" i="1" smtClean="0">
+                              <a:latin typeface="Cambria Math" panose="02040503050406030204" pitchFamily="18" charset="0"/>
+                            </a:rPr>
+                            <m:t>𝑛</m:t>
+                          </m:r>
+                          <m:r>
+                            <a:rPr lang="en-GB" b="0" i="1" smtClean="0">
+                              <a:latin typeface="Cambria Math" panose="02040503050406030204" pitchFamily="18" charset="0"/>
+                            </a:rPr>
+                            <m:t>−1)</m:t>
+                          </m:r>
+                        </m:sup>
+                      </m:sSubSup>
+                    </m:oMath>
+                  </m:oMathPara>
+                </a14:m>
+                <a:endParaRPr lang="en-GB" dirty="0"/>
+              </a:p>
+            </p:txBody>
+          </p:sp>
+        </mc:Choice>
+        <mc:Fallback>
+          <p:sp>
+            <p:nvSpPr>
+              <p:cNvPr id="15" name="TextBox 14">
+                <a:extLst>
+                  <a:ext uri="{FF2B5EF4-FFF2-40B4-BE49-F238E27FC236}">
+                    <a16:creationId xmlns:a16="http://schemas.microsoft.com/office/drawing/2014/main" id="{E4789EAD-2442-44FD-B673-CE3C15F8220A}"/>
+                  </a:ext>
+                </a:extLst>
+              </p:cNvPr>
+              <p:cNvSpPr txBox="1">
+                <a:spLocks noRot="1" noChangeAspect="1" noMove="1" noResize="1" noEditPoints="1" noAdjustHandles="1" noChangeArrowheads="1" noChangeShapeType="1" noTextEdit="1"/>
+              </p:cNvSpPr>
+              <p:nvPr/>
+            </p:nvSpPr>
+            <p:spPr>
+              <a:xfrm>
+                <a:off x="7475314" y="2225226"/>
+                <a:ext cx="1044453" cy="346249"/>
+              </a:xfrm>
+              <a:prstGeom prst="rect">
+                <a:avLst/>
+              </a:prstGeom>
+              <a:blipFill>
+                <a:blip r:embed="rId9"/>
+                <a:stretch>
+                  <a:fillRect l="-4651" t="-3509" r="-4651" b="-17544"/>
+                </a:stretch>
+              </a:blipFill>
+            </p:spPr>
+            <p:txBody>
+              <a:bodyPr/>
+              <a:lstStyle/>
+              <a:p>
+                <a:r>
+                  <a:rPr lang="en-GB">
+                    <a:noFill/>
+                  </a:rPr>
+                  <a:t> </a:t>
+                </a:r>
+              </a:p>
+            </p:txBody>
+          </p:sp>
+        </mc:Fallback>
+      </mc:AlternateContent>
+      <mc:AlternateContent xmlns:mc="http://schemas.openxmlformats.org/markup-compatibility/2006">
+        <mc:Choice xmlns:a14="http://schemas.microsoft.com/office/drawing/2010/main" Requires="a14">
+          <p:sp>
+            <p:nvSpPr>
+              <p:cNvPr id="16" name="TextBox 15">
+                <a:extLst>
+                  <a:ext uri="{FF2B5EF4-FFF2-40B4-BE49-F238E27FC236}">
+                    <a16:creationId xmlns:a16="http://schemas.microsoft.com/office/drawing/2014/main" id="{55415DB5-4598-41E7-9BB6-B0EBFC32EDC8}"/>
+                  </a:ext>
+                </a:extLst>
+              </p:cNvPr>
+              <p:cNvSpPr txBox="1"/>
+              <p:nvPr/>
+            </p:nvSpPr>
+            <p:spPr>
+              <a:xfrm>
+                <a:off x="5597328" y="2590679"/>
+                <a:ext cx="664734" cy="281744"/>
+              </a:xfrm>
+              <a:prstGeom prst="rect">
+                <a:avLst/>
+              </a:prstGeom>
+              <a:noFill/>
+            </p:spPr>
+            <p:txBody>
+              <a:bodyPr wrap="none" lIns="0" tIns="0" rIns="0" bIns="0" rtlCol="0">
+                <a:spAutoFit/>
+              </a:bodyPr>
+              <a:lstStyle/>
+              <a:p>
+                <a14:m>
+                  <m:oMathPara xmlns:m="http://schemas.openxmlformats.org/officeDocument/2006/math">
+                    <m:oMathParaPr>
+                      <m:jc m:val="centerGroup"/>
+                    </m:oMathParaPr>
+                    <m:oMath xmlns:m="http://schemas.openxmlformats.org/officeDocument/2006/math">
+                      <m:sSubSup>
+                        <m:sSubSupPr>
+                          <m:ctrlPr>
+                            <a:rPr lang="en-GB" b="0" i="1" smtClean="0">
+                              <a:latin typeface="Cambria Math" panose="02040503050406030204" pitchFamily="18" charset="0"/>
+                            </a:rPr>
+                          </m:ctrlPr>
+                        </m:sSubSupPr>
+                        <m:e>
+                          <m:r>
+                            <a:rPr lang="en-GB" b="0" i="1" smtClean="0">
+                              <a:latin typeface="Cambria Math" panose="02040503050406030204" pitchFamily="18" charset="0"/>
+                            </a:rPr>
+                            <m:t>𝑊</m:t>
+                          </m:r>
+                        </m:e>
+                        <m:sub>
+                          <m:r>
+                            <a:rPr lang="en-GB" b="0" i="1" smtClean="0">
+                              <a:latin typeface="Cambria Math" panose="02040503050406030204" pitchFamily="18" charset="0"/>
+                            </a:rPr>
+                            <m:t>𝑁</m:t>
+                          </m:r>
+                        </m:sub>
+                        <m:sup>
+                          <m:r>
+                            <a:rPr lang="en-GB" b="0" i="1" smtClean="0">
+                              <a:latin typeface="Cambria Math" panose="02040503050406030204" pitchFamily="18" charset="0"/>
+                            </a:rPr>
+                            <m:t>1 </m:t>
+                          </m:r>
+                          <m:r>
+                            <a:rPr lang="en-GB" b="0" i="1" smtClean="0">
+                              <a:latin typeface="Cambria Math" panose="02040503050406030204" pitchFamily="18" charset="0"/>
+                            </a:rPr>
+                            <m:t>𝑥</m:t>
+                          </m:r>
+                          <m:r>
+                            <a:rPr lang="en-GB" b="0" i="1" smtClean="0">
+                              <a:latin typeface="Cambria Math" panose="02040503050406030204" pitchFamily="18" charset="0"/>
+                            </a:rPr>
+                            <m:t> 1</m:t>
+                          </m:r>
+                        </m:sup>
+                      </m:sSubSup>
+                    </m:oMath>
+                  </m:oMathPara>
+                </a14:m>
+                <a:endParaRPr lang="en-GB" dirty="0"/>
+              </a:p>
+            </p:txBody>
+          </p:sp>
+        </mc:Choice>
+        <mc:Fallback>
+          <p:sp>
+            <p:nvSpPr>
+              <p:cNvPr id="16" name="TextBox 15">
+                <a:extLst>
+                  <a:ext uri="{FF2B5EF4-FFF2-40B4-BE49-F238E27FC236}">
+                    <a16:creationId xmlns:a16="http://schemas.microsoft.com/office/drawing/2014/main" id="{55415DB5-4598-41E7-9BB6-B0EBFC32EDC8}"/>
+                  </a:ext>
+                </a:extLst>
+              </p:cNvPr>
+              <p:cNvSpPr txBox="1">
+                <a:spLocks noRot="1" noChangeAspect="1" noMove="1" noResize="1" noEditPoints="1" noAdjustHandles="1" noChangeArrowheads="1" noChangeShapeType="1" noTextEdit="1"/>
+              </p:cNvSpPr>
+              <p:nvPr/>
+            </p:nvSpPr>
+            <p:spPr>
+              <a:xfrm>
+                <a:off x="5597328" y="2590679"/>
+                <a:ext cx="664734" cy="281744"/>
+              </a:xfrm>
+              <a:prstGeom prst="rect">
+                <a:avLst/>
+              </a:prstGeom>
+              <a:blipFill>
+                <a:blip r:embed="rId10"/>
+                <a:stretch>
+                  <a:fillRect l="-7339" t="-2174" r="-3670" b="-17391"/>
+                </a:stretch>
+              </a:blipFill>
+            </p:spPr>
+            <p:txBody>
+              <a:bodyPr/>
+              <a:lstStyle/>
+              <a:p>
+                <a:r>
+                  <a:rPr lang="en-GB">
+                    <a:noFill/>
+                  </a:rPr>
+                  <a:t> </a:t>
+                </a:r>
+              </a:p>
+            </p:txBody>
+          </p:sp>
+        </mc:Fallback>
+      </mc:AlternateContent>
+      <mc:AlternateContent xmlns:mc="http://schemas.openxmlformats.org/markup-compatibility/2006">
+        <mc:Choice xmlns:a14="http://schemas.microsoft.com/office/drawing/2010/main" Requires="a14">
+          <p:sp>
+            <p:nvSpPr>
+              <p:cNvPr id="17" name="TextBox 16">
+                <a:extLst>
+                  <a:ext uri="{FF2B5EF4-FFF2-40B4-BE49-F238E27FC236}">
+                    <a16:creationId xmlns:a16="http://schemas.microsoft.com/office/drawing/2014/main" id="{52081A00-6C5D-44C9-BC90-3FAB01023EC2}"/>
+                  </a:ext>
+                </a:extLst>
+              </p:cNvPr>
+              <p:cNvSpPr txBox="1"/>
+              <p:nvPr/>
+            </p:nvSpPr>
+            <p:spPr>
+              <a:xfrm>
+                <a:off x="5597328" y="2968323"/>
+                <a:ext cx="669671" cy="282321"/>
+              </a:xfrm>
+              <a:prstGeom prst="rect">
+                <a:avLst/>
+              </a:prstGeom>
+              <a:noFill/>
+            </p:spPr>
+            <p:txBody>
+              <a:bodyPr wrap="none" lIns="0" tIns="0" rIns="0" bIns="0" rtlCol="0">
+                <a:spAutoFit/>
+              </a:bodyPr>
+              <a:lstStyle/>
+              <a:p>
+                <a14:m>
+                  <m:oMathPara xmlns:m="http://schemas.openxmlformats.org/officeDocument/2006/math">
+                    <m:oMathParaPr>
+                      <m:jc m:val="centerGroup"/>
+                    </m:oMathParaPr>
+                    <m:oMath xmlns:m="http://schemas.openxmlformats.org/officeDocument/2006/math">
+                      <m:sSubSup>
+                        <m:sSubSupPr>
+                          <m:ctrlPr>
+                            <a:rPr lang="en-GB" b="0" i="1" smtClean="0">
+                              <a:latin typeface="Cambria Math" panose="02040503050406030204" pitchFamily="18" charset="0"/>
+                            </a:rPr>
+                          </m:ctrlPr>
+                        </m:sSubSupPr>
+                        <m:e>
+                          <m:r>
+                            <a:rPr lang="en-GB" b="0" i="1" smtClean="0">
+                              <a:latin typeface="Cambria Math" panose="02040503050406030204" pitchFamily="18" charset="0"/>
+                            </a:rPr>
+                            <m:t>𝑊</m:t>
+                          </m:r>
+                        </m:e>
+                        <m:sub>
+                          <m:r>
+                            <a:rPr lang="en-GB" b="0" i="1" smtClean="0">
+                              <a:latin typeface="Cambria Math" panose="02040503050406030204" pitchFamily="18" charset="0"/>
+                            </a:rPr>
+                            <m:t>𝑁</m:t>
+                          </m:r>
+                        </m:sub>
+                        <m:sup>
+                          <m:r>
+                            <a:rPr lang="en-GB" b="0" i="1" smtClean="0">
+                              <a:latin typeface="Cambria Math" panose="02040503050406030204" pitchFamily="18" charset="0"/>
+                            </a:rPr>
+                            <m:t>2 </m:t>
+                          </m:r>
+                          <m:r>
+                            <a:rPr lang="en-GB" b="0" i="1" smtClean="0">
+                              <a:latin typeface="Cambria Math" panose="02040503050406030204" pitchFamily="18" charset="0"/>
+                            </a:rPr>
+                            <m:t>𝑥</m:t>
+                          </m:r>
+                          <m:r>
+                            <a:rPr lang="en-GB" b="0" i="1" smtClean="0">
+                              <a:latin typeface="Cambria Math" panose="02040503050406030204" pitchFamily="18" charset="0"/>
+                            </a:rPr>
+                            <m:t> 1</m:t>
+                          </m:r>
+                        </m:sup>
+                      </m:sSubSup>
+                    </m:oMath>
+                  </m:oMathPara>
+                </a14:m>
+                <a:endParaRPr lang="en-GB" dirty="0"/>
+              </a:p>
+            </p:txBody>
+          </p:sp>
+        </mc:Choice>
+        <mc:Fallback>
+          <p:sp>
+            <p:nvSpPr>
+              <p:cNvPr id="17" name="TextBox 16">
+                <a:extLst>
+                  <a:ext uri="{FF2B5EF4-FFF2-40B4-BE49-F238E27FC236}">
+                    <a16:creationId xmlns:a16="http://schemas.microsoft.com/office/drawing/2014/main" id="{52081A00-6C5D-44C9-BC90-3FAB01023EC2}"/>
+                  </a:ext>
+                </a:extLst>
+              </p:cNvPr>
+              <p:cNvSpPr txBox="1">
+                <a:spLocks noRot="1" noChangeAspect="1" noMove="1" noResize="1" noEditPoints="1" noAdjustHandles="1" noChangeArrowheads="1" noChangeShapeType="1" noTextEdit="1"/>
+              </p:cNvSpPr>
+              <p:nvPr/>
+            </p:nvSpPr>
+            <p:spPr>
+              <a:xfrm>
+                <a:off x="5597328" y="2968323"/>
+                <a:ext cx="669671" cy="282321"/>
+              </a:xfrm>
+              <a:prstGeom prst="rect">
+                <a:avLst/>
+              </a:prstGeom>
+              <a:blipFill>
+                <a:blip r:embed="rId11"/>
+                <a:stretch>
+                  <a:fillRect l="-7273" t="-2174" r="-3636" b="-17391"/>
+                </a:stretch>
+              </a:blipFill>
+            </p:spPr>
+            <p:txBody>
+              <a:bodyPr/>
+              <a:lstStyle/>
+              <a:p>
+                <a:r>
+                  <a:rPr lang="en-GB">
+                    <a:noFill/>
+                  </a:rPr>
+                  <a:t> </a:t>
+                </a:r>
+              </a:p>
+            </p:txBody>
+          </p:sp>
+        </mc:Fallback>
+      </mc:AlternateContent>
+      <p:sp>
+        <p:nvSpPr>
+          <p:cNvPr id="18" name="TextBox 17">
+            <a:extLst>
+              <a:ext uri="{FF2B5EF4-FFF2-40B4-BE49-F238E27FC236}">
+                <a16:creationId xmlns:a16="http://schemas.microsoft.com/office/drawing/2014/main" id="{9DFD2F46-67FD-4D52-8662-F233D4ED91D3}"/>
+              </a:ext>
+            </a:extLst>
+          </p:cNvPr>
+          <p:cNvSpPr txBox="1"/>
+          <p:nvPr/>
+        </p:nvSpPr>
+        <p:spPr>
+          <a:xfrm rot="5400000">
+            <a:off x="5770976" y="3323150"/>
+            <a:ext cx="343364" cy="369332"/>
+          </a:xfrm>
+          <a:prstGeom prst="rect">
+            <a:avLst/>
+          </a:prstGeom>
+          <a:noFill/>
+        </p:spPr>
+        <p:txBody>
+          <a:bodyPr wrap="none" rtlCol="0">
+            <a:spAutoFit/>
+          </a:bodyPr>
+          <a:lstStyle/>
+          <a:p>
+            <a:r>
+              <a:rPr lang="en-GB" dirty="0"/>
+              <a:t>…</a:t>
+            </a:r>
+          </a:p>
+        </p:txBody>
+      </p:sp>
+      <mc:AlternateContent xmlns:mc="http://schemas.openxmlformats.org/markup-compatibility/2006">
+        <mc:Choice xmlns:a14="http://schemas.microsoft.com/office/drawing/2010/main" Requires="a14">
+          <p:sp>
+            <p:nvSpPr>
+              <p:cNvPr id="19" name="TextBox 18">
+                <a:extLst>
+                  <a:ext uri="{FF2B5EF4-FFF2-40B4-BE49-F238E27FC236}">
+                    <a16:creationId xmlns:a16="http://schemas.microsoft.com/office/drawing/2014/main" id="{2AC41B2E-8E45-4755-9016-E571D8F44A02}"/>
+                  </a:ext>
+                </a:extLst>
+              </p:cNvPr>
+              <p:cNvSpPr txBox="1"/>
+              <p:nvPr/>
+            </p:nvSpPr>
+            <p:spPr>
+              <a:xfrm>
+                <a:off x="6332393" y="2591514"/>
+                <a:ext cx="664734" cy="282321"/>
+              </a:xfrm>
+              <a:prstGeom prst="rect">
+                <a:avLst/>
+              </a:prstGeom>
+              <a:noFill/>
+            </p:spPr>
+            <p:txBody>
+              <a:bodyPr wrap="none" lIns="0" tIns="0" rIns="0" bIns="0" rtlCol="0">
+                <a:spAutoFit/>
+              </a:bodyPr>
+              <a:lstStyle/>
+              <a:p>
+                <a14:m>
+                  <m:oMathPara xmlns:m="http://schemas.openxmlformats.org/officeDocument/2006/math">
+                    <m:oMathParaPr>
+                      <m:jc m:val="centerGroup"/>
+                    </m:oMathParaPr>
+                    <m:oMath xmlns:m="http://schemas.openxmlformats.org/officeDocument/2006/math">
+                      <m:sSubSup>
+                        <m:sSubSupPr>
+                          <m:ctrlPr>
+                            <a:rPr lang="en-GB" b="0" i="1" smtClean="0">
+                              <a:latin typeface="Cambria Math" panose="02040503050406030204" pitchFamily="18" charset="0"/>
+                            </a:rPr>
+                          </m:ctrlPr>
+                        </m:sSubSupPr>
+                        <m:e>
+                          <m:r>
+                            <a:rPr lang="en-GB" b="0" i="1" smtClean="0">
+                              <a:latin typeface="Cambria Math" panose="02040503050406030204" pitchFamily="18" charset="0"/>
+                            </a:rPr>
+                            <m:t>𝑊</m:t>
+                          </m:r>
+                        </m:e>
+                        <m:sub>
+                          <m:r>
+                            <a:rPr lang="en-GB" b="0" i="1" smtClean="0">
+                              <a:latin typeface="Cambria Math" panose="02040503050406030204" pitchFamily="18" charset="0"/>
+                            </a:rPr>
+                            <m:t>𝑁</m:t>
+                          </m:r>
+                        </m:sub>
+                        <m:sup>
+                          <m:r>
+                            <a:rPr lang="en-GB" b="0" i="1" smtClean="0">
+                              <a:latin typeface="Cambria Math" panose="02040503050406030204" pitchFamily="18" charset="0"/>
+                            </a:rPr>
+                            <m:t>1 </m:t>
+                          </m:r>
+                          <m:r>
+                            <a:rPr lang="en-GB" b="0" i="1" smtClean="0">
+                              <a:latin typeface="Cambria Math" panose="02040503050406030204" pitchFamily="18" charset="0"/>
+                            </a:rPr>
+                            <m:t>𝑥</m:t>
+                          </m:r>
+                          <m:r>
+                            <a:rPr lang="en-GB" b="0" i="1" smtClean="0">
+                              <a:latin typeface="Cambria Math" panose="02040503050406030204" pitchFamily="18" charset="0"/>
+                            </a:rPr>
+                            <m:t> 2</m:t>
+                          </m:r>
+                        </m:sup>
+                      </m:sSubSup>
+                    </m:oMath>
+                  </m:oMathPara>
+                </a14:m>
+                <a:endParaRPr lang="en-GB" dirty="0"/>
+              </a:p>
+            </p:txBody>
+          </p:sp>
+        </mc:Choice>
+        <mc:Fallback>
+          <p:sp>
+            <p:nvSpPr>
+              <p:cNvPr id="19" name="TextBox 18">
+                <a:extLst>
+                  <a:ext uri="{FF2B5EF4-FFF2-40B4-BE49-F238E27FC236}">
+                    <a16:creationId xmlns:a16="http://schemas.microsoft.com/office/drawing/2014/main" id="{2AC41B2E-8E45-4755-9016-E571D8F44A02}"/>
+                  </a:ext>
+                </a:extLst>
+              </p:cNvPr>
+              <p:cNvSpPr txBox="1">
+                <a:spLocks noRot="1" noChangeAspect="1" noMove="1" noResize="1" noEditPoints="1" noAdjustHandles="1" noChangeArrowheads="1" noChangeShapeType="1" noTextEdit="1"/>
+              </p:cNvSpPr>
+              <p:nvPr/>
+            </p:nvSpPr>
+            <p:spPr>
+              <a:xfrm>
+                <a:off x="6332393" y="2591514"/>
+                <a:ext cx="664734" cy="282321"/>
+              </a:xfrm>
+              <a:prstGeom prst="rect">
+                <a:avLst/>
+              </a:prstGeom>
+              <a:blipFill>
+                <a:blip r:embed="rId12"/>
+                <a:stretch>
+                  <a:fillRect l="-8257" t="-2174" r="-2752" b="-19565"/>
+                </a:stretch>
+              </a:blipFill>
+            </p:spPr>
+            <p:txBody>
+              <a:bodyPr/>
+              <a:lstStyle/>
+              <a:p>
+                <a:r>
+                  <a:rPr lang="en-GB">
+                    <a:noFill/>
+                  </a:rPr>
+                  <a:t> </a:t>
+                </a:r>
+              </a:p>
+            </p:txBody>
+          </p:sp>
+        </mc:Fallback>
+      </mc:AlternateContent>
+      <mc:AlternateContent xmlns:mc="http://schemas.openxmlformats.org/markup-compatibility/2006">
+        <mc:Choice xmlns:a14="http://schemas.microsoft.com/office/drawing/2010/main" Requires="a14">
+          <p:sp>
+            <p:nvSpPr>
+              <p:cNvPr id="20" name="TextBox 19">
+                <a:extLst>
+                  <a:ext uri="{FF2B5EF4-FFF2-40B4-BE49-F238E27FC236}">
+                    <a16:creationId xmlns:a16="http://schemas.microsoft.com/office/drawing/2014/main" id="{BDE3886D-F980-47F4-A884-ED31B916666D}"/>
+                  </a:ext>
+                </a:extLst>
+              </p:cNvPr>
+              <p:cNvSpPr txBox="1"/>
+              <p:nvPr/>
+            </p:nvSpPr>
+            <p:spPr>
+              <a:xfrm>
+                <a:off x="6326241" y="2968322"/>
+                <a:ext cx="669671" cy="282321"/>
+              </a:xfrm>
+              <a:prstGeom prst="rect">
+                <a:avLst/>
+              </a:prstGeom>
+              <a:noFill/>
+            </p:spPr>
+            <p:txBody>
+              <a:bodyPr wrap="none" lIns="0" tIns="0" rIns="0" bIns="0" rtlCol="0">
+                <a:spAutoFit/>
+              </a:bodyPr>
+              <a:lstStyle/>
+              <a:p>
+                <a14:m>
+                  <m:oMathPara xmlns:m="http://schemas.openxmlformats.org/officeDocument/2006/math">
+                    <m:oMathParaPr>
+                      <m:jc m:val="centerGroup"/>
+                    </m:oMathParaPr>
+                    <m:oMath xmlns:m="http://schemas.openxmlformats.org/officeDocument/2006/math">
+                      <m:sSubSup>
+                        <m:sSubSupPr>
+                          <m:ctrlPr>
+                            <a:rPr lang="en-GB" b="0" i="1" smtClean="0">
+                              <a:latin typeface="Cambria Math" panose="02040503050406030204" pitchFamily="18" charset="0"/>
+                            </a:rPr>
+                          </m:ctrlPr>
+                        </m:sSubSupPr>
+                        <m:e>
+                          <m:r>
+                            <a:rPr lang="en-GB" b="0" i="1" smtClean="0">
+                              <a:latin typeface="Cambria Math" panose="02040503050406030204" pitchFamily="18" charset="0"/>
+                            </a:rPr>
+                            <m:t>𝑊</m:t>
+                          </m:r>
+                        </m:e>
+                        <m:sub>
+                          <m:r>
+                            <a:rPr lang="en-GB" b="0" i="1" smtClean="0">
+                              <a:latin typeface="Cambria Math" panose="02040503050406030204" pitchFamily="18" charset="0"/>
+                            </a:rPr>
+                            <m:t>𝑁</m:t>
+                          </m:r>
+                        </m:sub>
+                        <m:sup>
+                          <m:r>
+                            <a:rPr lang="en-GB" b="0" i="1" smtClean="0">
+                              <a:latin typeface="Cambria Math" panose="02040503050406030204" pitchFamily="18" charset="0"/>
+                            </a:rPr>
+                            <m:t>2 </m:t>
+                          </m:r>
+                          <m:r>
+                            <a:rPr lang="en-GB" b="0" i="1" smtClean="0">
+                              <a:latin typeface="Cambria Math" panose="02040503050406030204" pitchFamily="18" charset="0"/>
+                            </a:rPr>
+                            <m:t>𝑥</m:t>
+                          </m:r>
+                          <m:r>
+                            <a:rPr lang="en-GB" b="0" i="1" smtClean="0">
+                              <a:latin typeface="Cambria Math" panose="02040503050406030204" pitchFamily="18" charset="0"/>
+                            </a:rPr>
+                            <m:t> 2</m:t>
+                          </m:r>
+                        </m:sup>
+                      </m:sSubSup>
+                    </m:oMath>
+                  </m:oMathPara>
+                </a14:m>
+                <a:endParaRPr lang="en-GB" dirty="0"/>
+              </a:p>
+            </p:txBody>
+          </p:sp>
+        </mc:Choice>
+        <mc:Fallback>
+          <p:sp>
+            <p:nvSpPr>
+              <p:cNvPr id="20" name="TextBox 19">
+                <a:extLst>
+                  <a:ext uri="{FF2B5EF4-FFF2-40B4-BE49-F238E27FC236}">
+                    <a16:creationId xmlns:a16="http://schemas.microsoft.com/office/drawing/2014/main" id="{BDE3886D-F980-47F4-A884-ED31B916666D}"/>
+                  </a:ext>
+                </a:extLst>
+              </p:cNvPr>
+              <p:cNvSpPr txBox="1">
+                <a:spLocks noRot="1" noChangeAspect="1" noMove="1" noResize="1" noEditPoints="1" noAdjustHandles="1" noChangeArrowheads="1" noChangeShapeType="1" noTextEdit="1"/>
+              </p:cNvSpPr>
+              <p:nvPr/>
+            </p:nvSpPr>
+            <p:spPr>
+              <a:xfrm>
+                <a:off x="6326241" y="2968322"/>
+                <a:ext cx="669671" cy="282321"/>
+              </a:xfrm>
+              <a:prstGeom prst="rect">
+                <a:avLst/>
+              </a:prstGeom>
+              <a:blipFill>
+                <a:blip r:embed="rId13"/>
+                <a:stretch>
+                  <a:fillRect l="-8182" t="-2174" r="-2727" b="-17391"/>
+                </a:stretch>
+              </a:blipFill>
+            </p:spPr>
+            <p:txBody>
+              <a:bodyPr/>
+              <a:lstStyle/>
+              <a:p>
+                <a:r>
+                  <a:rPr lang="en-GB">
+                    <a:noFill/>
+                  </a:rPr>
+                  <a:t> </a:t>
+                </a:r>
+              </a:p>
+            </p:txBody>
+          </p:sp>
+        </mc:Fallback>
+      </mc:AlternateContent>
+      <p:sp>
+        <p:nvSpPr>
+          <p:cNvPr id="21" name="TextBox 20">
+            <a:extLst>
+              <a:ext uri="{FF2B5EF4-FFF2-40B4-BE49-F238E27FC236}">
+                <a16:creationId xmlns:a16="http://schemas.microsoft.com/office/drawing/2014/main" id="{B8B40907-2F9F-404D-B09E-9D8498504C20}"/>
+              </a:ext>
+            </a:extLst>
+          </p:cNvPr>
+          <p:cNvSpPr txBox="1"/>
+          <p:nvPr/>
+        </p:nvSpPr>
+        <p:spPr>
+          <a:xfrm>
+            <a:off x="7062519" y="2544797"/>
+            <a:ext cx="343364" cy="369332"/>
+          </a:xfrm>
+          <a:prstGeom prst="rect">
+            <a:avLst/>
+          </a:prstGeom>
+          <a:noFill/>
+        </p:spPr>
+        <p:txBody>
+          <a:bodyPr wrap="none" rtlCol="0">
+            <a:spAutoFit/>
+          </a:bodyPr>
+          <a:lstStyle/>
+          <a:p>
+            <a:r>
+              <a:rPr lang="en-GB" dirty="0"/>
+              <a:t>…</a:t>
+            </a:r>
+          </a:p>
+        </p:txBody>
+      </p:sp>
+      <p:sp>
+        <p:nvSpPr>
+          <p:cNvPr id="22" name="TextBox 21">
+            <a:extLst>
+              <a:ext uri="{FF2B5EF4-FFF2-40B4-BE49-F238E27FC236}">
+                <a16:creationId xmlns:a16="http://schemas.microsoft.com/office/drawing/2014/main" id="{6D0D4260-2867-4A88-B007-9B31F3E85CAC}"/>
+              </a:ext>
+            </a:extLst>
+          </p:cNvPr>
+          <p:cNvSpPr txBox="1"/>
+          <p:nvPr/>
+        </p:nvSpPr>
+        <p:spPr>
+          <a:xfrm>
+            <a:off x="7062519" y="2934482"/>
+            <a:ext cx="343364" cy="369332"/>
+          </a:xfrm>
+          <a:prstGeom prst="rect">
+            <a:avLst/>
+          </a:prstGeom>
+          <a:noFill/>
+        </p:spPr>
+        <p:txBody>
+          <a:bodyPr wrap="none" rtlCol="0">
+            <a:spAutoFit/>
+          </a:bodyPr>
+          <a:lstStyle/>
+          <a:p>
+            <a:r>
+              <a:rPr lang="en-GB" dirty="0"/>
+              <a:t>…</a:t>
+            </a:r>
+          </a:p>
+        </p:txBody>
+      </p:sp>
+      <p:sp>
+        <p:nvSpPr>
+          <p:cNvPr id="23" name="TextBox 22">
+            <a:extLst>
+              <a:ext uri="{FF2B5EF4-FFF2-40B4-BE49-F238E27FC236}">
+                <a16:creationId xmlns:a16="http://schemas.microsoft.com/office/drawing/2014/main" id="{CD605541-3A6C-4DDF-8AB2-3419E6732F9A}"/>
+              </a:ext>
+            </a:extLst>
+          </p:cNvPr>
+          <p:cNvSpPr txBox="1"/>
+          <p:nvPr/>
+        </p:nvSpPr>
+        <p:spPr>
+          <a:xfrm rot="5400000">
+            <a:off x="6486182" y="3332146"/>
+            <a:ext cx="343364" cy="369332"/>
+          </a:xfrm>
+          <a:prstGeom prst="rect">
+            <a:avLst/>
+          </a:prstGeom>
+          <a:noFill/>
+        </p:spPr>
+        <p:txBody>
+          <a:bodyPr wrap="square" rtlCol="0">
+            <a:spAutoFit/>
+          </a:bodyPr>
+          <a:lstStyle/>
+          <a:p>
+            <a:r>
+              <a:rPr lang="en-GB" dirty="0"/>
+              <a:t>…</a:t>
+            </a:r>
+          </a:p>
+        </p:txBody>
+      </p:sp>
+      <p:sp>
+        <p:nvSpPr>
+          <p:cNvPr id="24" name="TextBox 23">
+            <a:extLst>
+              <a:ext uri="{FF2B5EF4-FFF2-40B4-BE49-F238E27FC236}">
+                <a16:creationId xmlns:a16="http://schemas.microsoft.com/office/drawing/2014/main" id="{CAC43899-AE43-4E0C-9711-CE0212C2B4B2}"/>
+              </a:ext>
+            </a:extLst>
+          </p:cNvPr>
+          <p:cNvSpPr txBox="1"/>
+          <p:nvPr/>
+        </p:nvSpPr>
+        <p:spPr>
+          <a:xfrm rot="2789975">
+            <a:off x="7062519" y="3338413"/>
+            <a:ext cx="343364" cy="369332"/>
+          </a:xfrm>
+          <a:prstGeom prst="rect">
+            <a:avLst/>
+          </a:prstGeom>
+          <a:noFill/>
+        </p:spPr>
+        <p:txBody>
+          <a:bodyPr wrap="none" rtlCol="0">
+            <a:spAutoFit/>
+          </a:bodyPr>
+          <a:lstStyle/>
+          <a:p>
+            <a:r>
+              <a:rPr lang="en-GB" dirty="0"/>
+              <a:t>…</a:t>
+            </a:r>
+          </a:p>
+        </p:txBody>
+      </p:sp>
+      <mc:AlternateContent xmlns:mc="http://schemas.openxmlformats.org/markup-compatibility/2006">
+        <mc:Choice xmlns:a14="http://schemas.microsoft.com/office/drawing/2010/main" Requires="a14">
+          <p:sp>
+            <p:nvSpPr>
+              <p:cNvPr id="25" name="TextBox 24">
+                <a:extLst>
+                  <a:ext uri="{FF2B5EF4-FFF2-40B4-BE49-F238E27FC236}">
+                    <a16:creationId xmlns:a16="http://schemas.microsoft.com/office/drawing/2014/main" id="{CDF96183-515F-43F6-AC32-A2AA4386058B}"/>
+                  </a:ext>
+                </a:extLst>
+              </p:cNvPr>
+              <p:cNvSpPr txBox="1"/>
+              <p:nvPr/>
+            </p:nvSpPr>
+            <p:spPr>
+              <a:xfrm>
+                <a:off x="7475313" y="3730980"/>
+                <a:ext cx="856645" cy="361959"/>
+              </a:xfrm>
+              <a:prstGeom prst="rect">
+                <a:avLst/>
+              </a:prstGeom>
+              <a:noFill/>
+            </p:spPr>
+            <p:txBody>
+              <a:bodyPr wrap="none" lIns="0" tIns="0" rIns="0" bIns="0" rtlCol="0">
+                <a:spAutoFit/>
+              </a:bodyPr>
+              <a:lstStyle/>
+              <a:p>
+                <a14:m>
+                  <m:oMathPara xmlns:m="http://schemas.openxmlformats.org/officeDocument/2006/math">
+                    <m:oMathParaPr>
+                      <m:jc m:val="centerGroup"/>
+                    </m:oMathParaPr>
+                    <m:oMath xmlns:m="http://schemas.openxmlformats.org/officeDocument/2006/math">
+                      <m:sSubSup>
+                        <m:sSubSupPr>
+                          <m:ctrlPr>
+                            <a:rPr lang="en-GB" b="0" i="1" smtClean="0">
+                              <a:latin typeface="Cambria Math" panose="02040503050406030204" pitchFamily="18" charset="0"/>
+                            </a:rPr>
+                          </m:ctrlPr>
+                        </m:sSubSupPr>
+                        <m:e>
+                          <m:r>
+                            <a:rPr lang="en-GB" b="0" i="1" smtClean="0">
+                              <a:latin typeface="Cambria Math" panose="02040503050406030204" pitchFamily="18" charset="0"/>
+                            </a:rPr>
+                            <m:t>𝑊</m:t>
+                          </m:r>
+                        </m:e>
+                        <m:sub>
+                          <m:r>
+                            <a:rPr lang="en-GB" b="0" i="1" smtClean="0">
+                              <a:latin typeface="Cambria Math" panose="02040503050406030204" pitchFamily="18" charset="0"/>
+                            </a:rPr>
+                            <m:t>𝑁</m:t>
+                          </m:r>
+                        </m:sub>
+                        <m:sup>
+                          <m:sSup>
+                            <m:sSupPr>
+                              <m:ctrlPr>
+                                <a:rPr lang="en-GB" b="0" i="1" smtClean="0">
+                                  <a:latin typeface="Cambria Math" panose="02040503050406030204" pitchFamily="18" charset="0"/>
+                                </a:rPr>
+                              </m:ctrlPr>
+                            </m:sSupPr>
+                            <m:e>
+                              <m:d>
+                                <m:dPr>
+                                  <m:ctrlPr>
+                                    <a:rPr lang="en-GB" b="0" i="1" smtClean="0">
+                                      <a:latin typeface="Cambria Math" panose="02040503050406030204" pitchFamily="18" charset="0"/>
+                                    </a:rPr>
+                                  </m:ctrlPr>
+                                </m:dPr>
+                                <m:e>
+                                  <m:r>
+                                    <a:rPr lang="en-GB" b="0" i="1" smtClean="0">
+                                      <a:latin typeface="Cambria Math" panose="02040503050406030204" pitchFamily="18" charset="0"/>
+                                    </a:rPr>
+                                    <m:t>𝑛</m:t>
+                                  </m:r>
+                                  <m:r>
+                                    <a:rPr lang="en-GB" b="0" i="1" smtClean="0">
+                                      <a:latin typeface="Cambria Math" panose="02040503050406030204" pitchFamily="18" charset="0"/>
+                                    </a:rPr>
+                                    <m:t>−1</m:t>
+                                  </m:r>
+                                </m:e>
+                              </m:d>
+                            </m:e>
+                            <m:sup>
+                              <m:r>
+                                <a:rPr lang="en-GB" b="0" i="1" smtClean="0">
+                                  <a:latin typeface="Cambria Math" panose="02040503050406030204" pitchFamily="18" charset="0"/>
+                                </a:rPr>
+                                <m:t>2</m:t>
+                              </m:r>
+                            </m:sup>
+                          </m:sSup>
+                        </m:sup>
+                      </m:sSubSup>
+                    </m:oMath>
+                  </m:oMathPara>
+                </a14:m>
+                <a:endParaRPr lang="en-GB" dirty="0"/>
+              </a:p>
+            </p:txBody>
+          </p:sp>
+        </mc:Choice>
+        <mc:Fallback>
+          <p:sp>
+            <p:nvSpPr>
+              <p:cNvPr id="25" name="TextBox 24">
+                <a:extLst>
+                  <a:ext uri="{FF2B5EF4-FFF2-40B4-BE49-F238E27FC236}">
+                    <a16:creationId xmlns:a16="http://schemas.microsoft.com/office/drawing/2014/main" id="{CDF96183-515F-43F6-AC32-A2AA4386058B}"/>
+                  </a:ext>
+                </a:extLst>
+              </p:cNvPr>
+              <p:cNvSpPr txBox="1">
+                <a:spLocks noRot="1" noChangeAspect="1" noMove="1" noResize="1" noEditPoints="1" noAdjustHandles="1" noChangeArrowheads="1" noChangeShapeType="1" noTextEdit="1"/>
+              </p:cNvSpPr>
+              <p:nvPr/>
+            </p:nvSpPr>
+            <p:spPr>
+              <a:xfrm>
+                <a:off x="7475313" y="3730980"/>
+                <a:ext cx="856645" cy="361959"/>
+              </a:xfrm>
+              <a:prstGeom prst="rect">
+                <a:avLst/>
+              </a:prstGeom>
+              <a:blipFill>
+                <a:blip r:embed="rId14"/>
+                <a:stretch>
+                  <a:fillRect l="-5674" b="-16949"/>
+                </a:stretch>
+              </a:blipFill>
+            </p:spPr>
+            <p:txBody>
+              <a:bodyPr/>
+              <a:lstStyle/>
+              <a:p>
+                <a:r>
+                  <a:rPr lang="en-GB">
+                    <a:noFill/>
+                  </a:rPr>
+                  <a:t> </a:t>
+                </a:r>
+              </a:p>
+            </p:txBody>
+          </p:sp>
+        </mc:Fallback>
+      </mc:AlternateContent>
+      <mc:AlternateContent xmlns:mc="http://schemas.openxmlformats.org/markup-compatibility/2006">
+        <mc:Choice xmlns:a14="http://schemas.microsoft.com/office/drawing/2010/main" Requires="a14">
+          <p:sp>
+            <p:nvSpPr>
+              <p:cNvPr id="26" name="TextBox 25">
+                <a:extLst>
+                  <a:ext uri="{FF2B5EF4-FFF2-40B4-BE49-F238E27FC236}">
+                    <a16:creationId xmlns:a16="http://schemas.microsoft.com/office/drawing/2014/main" id="{BE7A2343-649D-41DD-B7F6-507247A49084}"/>
+                  </a:ext>
+                </a:extLst>
+              </p:cNvPr>
+              <p:cNvSpPr txBox="1"/>
+              <p:nvPr/>
+            </p:nvSpPr>
+            <p:spPr>
+              <a:xfrm>
+                <a:off x="8551811" y="2994430"/>
+                <a:ext cx="389145" cy="276999"/>
+              </a:xfrm>
+              <a:prstGeom prst="rect">
+                <a:avLst/>
+              </a:prstGeom>
+              <a:noFill/>
+            </p:spPr>
+            <p:txBody>
+              <a:bodyPr wrap="none" lIns="0" tIns="0" rIns="0" bIns="0" rtlCol="0">
+                <a:spAutoFit/>
+              </a:bodyPr>
+              <a:lstStyle/>
+              <a:p>
+                <a14:m>
+                  <m:oMathPara xmlns:m="http://schemas.openxmlformats.org/officeDocument/2006/math">
+                    <m:oMathParaPr>
+                      <m:jc m:val="centerGroup"/>
+                    </m:oMathParaPr>
+                    <m:oMath xmlns:m="http://schemas.openxmlformats.org/officeDocument/2006/math">
+                      <m:r>
+                        <a:rPr lang="en-GB" b="0" i="1" smtClean="0">
+                          <a:latin typeface="Cambria Math" panose="02040503050406030204" pitchFamily="18" charset="0"/>
+                        </a:rPr>
+                        <m:t>. </m:t>
+                      </m:r>
+                      <m:sSub>
+                        <m:sSubPr>
+                          <m:ctrlPr>
+                            <a:rPr lang="en-GB" b="0" i="1" smtClean="0">
+                              <a:latin typeface="Cambria Math" panose="02040503050406030204" pitchFamily="18" charset="0"/>
+                            </a:rPr>
+                          </m:ctrlPr>
+                        </m:sSubPr>
+                        <m:e>
+                          <m:r>
+                            <a:rPr lang="en-GB" b="0" i="1" smtClean="0">
+                              <a:latin typeface="Cambria Math" panose="02040503050406030204" pitchFamily="18" charset="0"/>
+                            </a:rPr>
+                            <m:t>𝑎</m:t>
+                          </m:r>
+                        </m:e>
+                        <m:sub>
+                          <m:r>
+                            <a:rPr lang="en-GB" b="0" i="1" smtClean="0">
+                              <a:latin typeface="Cambria Math" panose="02040503050406030204" pitchFamily="18" charset="0"/>
+                            </a:rPr>
+                            <m:t>𝑛</m:t>
+                          </m:r>
+                        </m:sub>
+                      </m:sSub>
+                    </m:oMath>
+                  </m:oMathPara>
+                </a14:m>
+                <a:endParaRPr lang="en-GB" dirty="0"/>
+              </a:p>
+            </p:txBody>
+          </p:sp>
+        </mc:Choice>
+        <mc:Fallback>
+          <p:sp>
+            <p:nvSpPr>
+              <p:cNvPr id="26" name="TextBox 25">
+                <a:extLst>
+                  <a:ext uri="{FF2B5EF4-FFF2-40B4-BE49-F238E27FC236}">
+                    <a16:creationId xmlns:a16="http://schemas.microsoft.com/office/drawing/2014/main" id="{BE7A2343-649D-41DD-B7F6-507247A49084}"/>
+                  </a:ext>
+                </a:extLst>
+              </p:cNvPr>
+              <p:cNvSpPr txBox="1">
+                <a:spLocks noRot="1" noChangeAspect="1" noMove="1" noResize="1" noEditPoints="1" noAdjustHandles="1" noChangeArrowheads="1" noChangeShapeType="1" noTextEdit="1"/>
+              </p:cNvSpPr>
+              <p:nvPr/>
+            </p:nvSpPr>
+            <p:spPr>
+              <a:xfrm>
+                <a:off x="8551811" y="2994430"/>
+                <a:ext cx="389145" cy="276999"/>
+              </a:xfrm>
+              <a:prstGeom prst="rect">
+                <a:avLst/>
+              </a:prstGeom>
+              <a:blipFill>
+                <a:blip r:embed="rId15"/>
+                <a:stretch>
+                  <a:fillRect r="-1563" b="-10870"/>
+                </a:stretch>
+              </a:blipFill>
+            </p:spPr>
+            <p:txBody>
+              <a:bodyPr/>
+              <a:lstStyle/>
+              <a:p>
+                <a:r>
+                  <a:rPr lang="en-GB">
+                    <a:noFill/>
+                  </a:rPr>
+                  <a:t> </a:t>
+                </a:r>
+              </a:p>
+            </p:txBody>
+          </p:sp>
+        </mc:Fallback>
+      </mc:AlternateContent>
+      <p:sp>
+        <p:nvSpPr>
+          <p:cNvPr id="27" name="TextBox 26">
+            <a:extLst>
+              <a:ext uri="{FF2B5EF4-FFF2-40B4-BE49-F238E27FC236}">
+                <a16:creationId xmlns:a16="http://schemas.microsoft.com/office/drawing/2014/main" id="{62577C8F-825C-4974-9876-15B892AB0167}"/>
+              </a:ext>
+            </a:extLst>
+          </p:cNvPr>
+          <p:cNvSpPr txBox="1"/>
+          <p:nvPr/>
+        </p:nvSpPr>
+        <p:spPr>
+          <a:xfrm rot="5400000">
+            <a:off x="7705043" y="2925666"/>
+            <a:ext cx="343364" cy="369332"/>
+          </a:xfrm>
+          <a:prstGeom prst="rect">
+            <a:avLst/>
+          </a:prstGeom>
+          <a:noFill/>
+        </p:spPr>
+        <p:txBody>
+          <a:bodyPr wrap="square" rtlCol="0">
+            <a:spAutoFit/>
+          </a:bodyPr>
+          <a:lstStyle/>
+          <a:p>
+            <a:r>
+              <a:rPr lang="en-GB" dirty="0"/>
+              <a:t>…</a:t>
+            </a:r>
+          </a:p>
+        </p:txBody>
+      </p:sp>
+    </p:spTree>
+    <p:extLst>
+      <p:ext uri="{BB962C8B-B14F-4D97-AF65-F5344CB8AC3E}">
+        <p14:creationId xmlns:p14="http://schemas.microsoft.com/office/powerpoint/2010/main" val="734611042"/>
       </p:ext>
     </p:extLst>
   </p:cSld>

</xml_diff>